<commit_message>
basic_new added diagrams. JSON converter and more infor in MODULE 2
</commit_message>
<xml_diff>
--- a/basic_new/Module 01 - Basic Concepts.pptx
+++ b/basic_new/Module 01 - Basic Concepts.pptx
@@ -5,38 +5,39 @@
     <p:sldMasterId id="2147483648" r:id="rId1"/>
   </p:sldMasterIdLst>
   <p:notesMasterIdLst>
-    <p:notesMasterId r:id="rId31"/>
+    <p:notesMasterId r:id="rId32"/>
   </p:notesMasterIdLst>
   <p:sldIdLst>
     <p:sldId id="321" r:id="rId2"/>
     <p:sldId id="258" r:id="rId3"/>
     <p:sldId id="264" r:id="rId4"/>
-    <p:sldId id="322" r:id="rId5"/>
-    <p:sldId id="265" r:id="rId6"/>
-    <p:sldId id="320" r:id="rId7"/>
-    <p:sldId id="266" r:id="rId8"/>
-    <p:sldId id="325" r:id="rId9"/>
-    <p:sldId id="324" r:id="rId10"/>
-    <p:sldId id="326" r:id="rId11"/>
-    <p:sldId id="327" r:id="rId12"/>
-    <p:sldId id="328" r:id="rId13"/>
-    <p:sldId id="323" r:id="rId14"/>
-    <p:sldId id="267" r:id="rId15"/>
-    <p:sldId id="270" r:id="rId16"/>
-    <p:sldId id="271" r:id="rId17"/>
-    <p:sldId id="273" r:id="rId18"/>
-    <p:sldId id="329" r:id="rId19"/>
-    <p:sldId id="330" r:id="rId20"/>
-    <p:sldId id="331" r:id="rId21"/>
-    <p:sldId id="332" r:id="rId22"/>
-    <p:sldId id="279" r:id="rId23"/>
-    <p:sldId id="280" r:id="rId24"/>
-    <p:sldId id="308" r:id="rId25"/>
-    <p:sldId id="309" r:id="rId26"/>
-    <p:sldId id="333" r:id="rId27"/>
-    <p:sldId id="314" r:id="rId28"/>
-    <p:sldId id="294" r:id="rId29"/>
-    <p:sldId id="316" r:id="rId30"/>
+    <p:sldId id="334" r:id="rId5"/>
+    <p:sldId id="322" r:id="rId6"/>
+    <p:sldId id="265" r:id="rId7"/>
+    <p:sldId id="320" r:id="rId8"/>
+    <p:sldId id="266" r:id="rId9"/>
+    <p:sldId id="325" r:id="rId10"/>
+    <p:sldId id="324" r:id="rId11"/>
+    <p:sldId id="326" r:id="rId12"/>
+    <p:sldId id="327" r:id="rId13"/>
+    <p:sldId id="328" r:id="rId14"/>
+    <p:sldId id="323" r:id="rId15"/>
+    <p:sldId id="267" r:id="rId16"/>
+    <p:sldId id="270" r:id="rId17"/>
+    <p:sldId id="271" r:id="rId18"/>
+    <p:sldId id="273" r:id="rId19"/>
+    <p:sldId id="329" r:id="rId20"/>
+    <p:sldId id="330" r:id="rId21"/>
+    <p:sldId id="331" r:id="rId22"/>
+    <p:sldId id="332" r:id="rId23"/>
+    <p:sldId id="279" r:id="rId24"/>
+    <p:sldId id="280" r:id="rId25"/>
+    <p:sldId id="308" r:id="rId26"/>
+    <p:sldId id="309" r:id="rId27"/>
+    <p:sldId id="333" r:id="rId28"/>
+    <p:sldId id="314" r:id="rId29"/>
+    <p:sldId id="294" r:id="rId30"/>
+    <p:sldId id="316" r:id="rId31"/>
   </p:sldIdLst>
   <p:sldSz cx="12192000" cy="6858000"/>
   <p:notesSz cx="6858000" cy="9144000"/>
@@ -509,7 +510,7 @@
           <a:p>
             <a:fld id="{81043921-7569-41A3-B947-8944ED878C50}" type="datetimeFigureOut">
               <a:rPr lang="he-IL" smtClean="0"/>
-              <a:t>א'/תמוז/תשפ"ג</a:t>
+              <a:t>ט"ז/תמוז/תשפ"ג</a:t>
             </a:fld>
             <a:endParaRPr lang="he-IL"/>
           </a:p>
@@ -1048,13 +1049,123 @@
           <a:bodyPr/>
           <a:lstStyle/>
           <a:p>
-            <a:pPr algn="l" rtl="0" eaLnBrk="1" hangingPunct="1">
-              <a:lnSpc>
-                <a:spcPct val="80000"/>
-              </a:lnSpc>
+            <a:r>
+              <a:rPr lang="en-US" dirty="0">
+                <a:solidFill>
+                  <a:srgbClr val="000000"/>
+                </a:solidFill>
+                <a:latin typeface="Tahoma"/>
+                <a:ea typeface="Tahoma"/>
+                <a:cs typeface="Tahoma"/>
+              </a:rPr>
+              <a:t>PyCharm is currently one of the most used IDE for python development, It provides code analysis, a graphical debugger, an integrated unit tester, integration with version control systems (VCSes), and supports web development with Django as well as data science with Anaconda.</a:t>
+            </a:r>
+          </a:p>
+          <a:p>
+            <a:endParaRPr lang="en-US" dirty="0">
+              <a:solidFill>
+                <a:srgbClr val="000000"/>
+              </a:solidFill>
+              <a:latin typeface="Tahoma"/>
+              <a:ea typeface="Tahoma"/>
+              <a:cs typeface="Tahoma"/>
+            </a:endParaRPr>
+          </a:p>
+          <a:p>
+            <a:r>
+              <a:rPr lang="en-US" dirty="0">
+                <a:solidFill>
+                  <a:srgbClr val="000000"/>
+                </a:solidFill>
+                <a:latin typeface="Tahoma"/>
+                <a:ea typeface="Tahoma"/>
+                <a:cs typeface="Tahoma"/>
+              </a:rPr>
+              <a:t>It was created by JetBrains</a:t>
+            </a:r>
+          </a:p>
+          <a:p>
+            <a:endParaRPr lang="en-US" dirty="0">
+              <a:solidFill>
+                <a:srgbClr val="000000"/>
+              </a:solidFill>
+              <a:latin typeface="Tahoma"/>
+              <a:ea typeface="Tahoma"/>
+              <a:cs typeface="Tahoma"/>
+            </a:endParaRPr>
+          </a:p>
+          <a:p>
+            <a:r>
+              <a:rPr lang="en-US" dirty="0">
+                <a:solidFill>
+                  <a:srgbClr val="000000"/>
+                </a:solidFill>
+                <a:latin typeface="Tahoma"/>
+                <a:ea typeface="Tahoma"/>
+                <a:cs typeface="Tahoma"/>
+              </a:rPr>
+              <a:t>It is mostly popular because of many things, such as:</a:t>
+            </a:r>
+          </a:p>
+          <a:p>
+            <a:pPr marL="171450" indent="-171450">
+              <a:buFont typeface="Arial"/>
+              <a:buChar char="•"/>
             </a:pPr>
+            <a:r>
+              <a:rPr lang="en-US" dirty="0">
+                <a:solidFill>
+                  <a:srgbClr val="000000"/>
+                </a:solidFill>
+                <a:latin typeface="Tahoma"/>
+                <a:ea typeface="Tahoma"/>
+                <a:cs typeface="Tahoma"/>
+              </a:rPr>
+              <a:t>It is considered as an intelligent code editor, fast and safe refactoring, and smart code.</a:t>
+            </a:r>
+          </a:p>
+          <a:p>
+            <a:pPr marL="171450" indent="-171450">
+              <a:buFont typeface="Arial"/>
+              <a:buChar char="•"/>
+            </a:pPr>
+            <a:r>
+              <a:rPr lang="en-US" dirty="0">
+                <a:solidFill>
+                  <a:srgbClr val="000000"/>
+                </a:solidFill>
+                <a:latin typeface="Tahoma"/>
+                <a:ea typeface="Tahoma"/>
+                <a:cs typeface="Tahoma"/>
+              </a:rPr>
+              <a:t>Features for debugging, profiling, remote development, testing the code, auto code completion, quick fixing, error detection and tools of the database.</a:t>
+            </a:r>
+          </a:p>
+          <a:p>
+            <a:pPr marL="171450" indent="-171450">
+              <a:buFont typeface="Arial"/>
+              <a:buChar char="•"/>
+            </a:pPr>
+            <a:r>
+              <a:rPr lang="en-US" dirty="0">
+                <a:solidFill>
+                  <a:srgbClr val="000000"/>
+                </a:solidFill>
+                <a:latin typeface="Tahoma"/>
+                <a:ea typeface="Tahoma"/>
+                <a:cs typeface="Tahoma"/>
+              </a:rPr>
+              <a:t>Support for Popular web technologies, web frameworks, scientific libraries and version control. </a:t>
+            </a:r>
+          </a:p>
+          <a:p>
             <a:endParaRPr lang="en-US" dirty="0">
-              <a:cs typeface="Calibri"/>
+              <a:solidFill>
+                <a:srgbClr val="000000"/>
+              </a:solidFill>
+              <a:latin typeface="Tahoma"/>
+              <a:ea typeface="Tahoma"/>
+              <a:cs typeface="Tahoma"/>
             </a:endParaRPr>
           </a:p>
         </p:txBody>
@@ -1086,7 +1197,7 @@
     </p:spTree>
     <p:extLst>
       <p:ext uri="{BB962C8B-B14F-4D97-AF65-F5344CB8AC3E}">
-        <p14:creationId xmlns:p14="http://schemas.microsoft.com/office/powerpoint/2010/main" val="662288823"/>
+        <p14:creationId xmlns:p14="http://schemas.microsoft.com/office/powerpoint/2010/main" val="925471829"/>
       </p:ext>
     </p:extLst>
   </p:cSld>
@@ -1140,7 +1251,14 @@
           <a:bodyPr/>
           <a:lstStyle/>
           <a:p>
-            <a:endParaRPr lang="en-US"/>
+            <a:pPr algn="l" rtl="0" eaLnBrk="1" hangingPunct="1">
+              <a:lnSpc>
+                <a:spcPct val="80000"/>
+              </a:lnSpc>
+            </a:pPr>
+            <a:endParaRPr lang="en-US" dirty="0">
+              <a:cs typeface="Calibri"/>
+            </a:endParaRPr>
           </a:p>
         </p:txBody>
       </p:sp>
@@ -1171,7 +1289,7 @@
     </p:spTree>
     <p:extLst>
       <p:ext uri="{BB962C8B-B14F-4D97-AF65-F5344CB8AC3E}">
-        <p14:creationId xmlns:p14="http://schemas.microsoft.com/office/powerpoint/2010/main" val="3896666901"/>
+        <p14:creationId xmlns:p14="http://schemas.microsoft.com/office/powerpoint/2010/main" val="662288823"/>
       </p:ext>
     </p:extLst>
   </p:cSld>
@@ -1225,78 +1343,7 @@
           <a:bodyPr/>
           <a:lstStyle/>
           <a:p>
-            <a:pPr>
-              <a:defRPr/>
-            </a:pPr>
-            <a:r>
-              <a:rPr lang="en-US" dirty="0">
-                <a:cs typeface="Calibri"/>
-              </a:rPr>
-              <a:t>This is the main screen for opening a new project, all project are "of the same type" but not really.</a:t>
-            </a:r>
-          </a:p>
-          <a:p>
-            <a:pPr>
-              <a:defRPr/>
-            </a:pPr>
-            <a:r>
-              <a:rPr lang="en-US" dirty="0">
-                <a:cs typeface="+mn-lt"/>
-              </a:rPr>
-              <a:t>We can choose our projects name by changing the last section of the  location box</a:t>
-            </a:r>
-          </a:p>
-          <a:p>
-            <a:pPr>
-              <a:defRPr/>
-            </a:pPr>
-            <a:br>
-              <a:rPr lang="en-US" dirty="0">
-                <a:cs typeface="+mn-lt"/>
-              </a:rPr>
-            </a:br>
-            <a:r>
-              <a:rPr lang="en-US" dirty="0">
-                <a:cs typeface="Calibri"/>
-              </a:rPr>
-              <a:t>We can choose different environments like Virtualenv(the base one here), or Conda.</a:t>
-            </a:r>
-            <a:endParaRPr lang="en-US" dirty="0"/>
-          </a:p>
-          <a:p>
-            <a:pPr>
-              <a:defRPr/>
-            </a:pPr>
-            <a:endParaRPr lang="en-US" dirty="0">
-              <a:cs typeface="Calibri"/>
-            </a:endParaRPr>
-          </a:p>
-          <a:p>
-            <a:pPr>
-              <a:defRPr/>
-            </a:pPr>
-            <a:r>
-              <a:rPr lang="en-US" dirty="0">
-                <a:cs typeface="Calibri"/>
-              </a:rPr>
-              <a:t>Also, we can use a new (base) interpreter or just pick one of our previously used ones if we choose so.</a:t>
-            </a:r>
-            <a:br>
-              <a:rPr lang="en-US" dirty="0">
-                <a:cs typeface="+mn-lt"/>
-              </a:rPr>
-            </a:br>
-            <a:br>
-              <a:rPr lang="en-US" dirty="0">
-                <a:cs typeface="+mn-lt"/>
-              </a:rPr>
-            </a:br>
-            <a:r>
-              <a:rPr lang="en-US" dirty="0">
-                <a:cs typeface="Calibri"/>
-              </a:rPr>
-              <a:t>For beginners this is all we need to know, we want a new interpreter </a:t>
-            </a:r>
+            <a:endParaRPr lang="en-US"/>
           </a:p>
         </p:txBody>
       </p:sp>
@@ -1327,7 +1374,7 @@
     </p:spTree>
     <p:extLst>
       <p:ext uri="{BB962C8B-B14F-4D97-AF65-F5344CB8AC3E}">
-        <p14:creationId xmlns:p14="http://schemas.microsoft.com/office/powerpoint/2010/main" val="3949587220"/>
+        <p14:creationId xmlns:p14="http://schemas.microsoft.com/office/powerpoint/2010/main" val="3896666901"/>
       </p:ext>
     </p:extLst>
   </p:cSld>
@@ -1381,10 +1428,31 @@
           <a:bodyPr/>
           <a:lstStyle/>
           <a:p>
-            <a:r>
-              <a:rPr lang="en-US" dirty="0"/>
-              <a:t>This is the main work area in PyCharm:</a:t>
-            </a:r>
+            <a:pPr>
+              <a:defRPr/>
+            </a:pPr>
+            <a:r>
+              <a:rPr lang="en-US" dirty="0">
+                <a:cs typeface="Calibri"/>
+              </a:rPr>
+              <a:t>This is the main screen for opening a new project, all project are "of the same type" but not really.</a:t>
+            </a:r>
+          </a:p>
+          <a:p>
+            <a:pPr>
+              <a:defRPr/>
+            </a:pPr>
+            <a:r>
+              <a:rPr lang="en-US" dirty="0">
+                <a:cs typeface="+mn-lt"/>
+              </a:rPr>
+              <a:t>We can choose our projects name by changing the last section of the  location box</a:t>
+            </a:r>
+          </a:p>
+          <a:p>
+            <a:pPr>
+              <a:defRPr/>
+            </a:pPr>
             <a:br>
               <a:rPr lang="en-US" dirty="0">
                 <a:cs typeface="+mn-lt"/>
@@ -1394,45 +1462,44 @@
               <a:rPr lang="en-US" dirty="0">
                 <a:cs typeface="Calibri"/>
               </a:rPr>
-              <a:t>The Coding section is where you write you code</a:t>
-            </a:r>
-          </a:p>
-          <a:p>
-            <a:r>
-              <a:rPr lang="en-US" dirty="0">
-                <a:cs typeface="Calibri"/>
-              </a:rPr>
-              <a:t>Menu bar is all the options, setting etc.</a:t>
-            </a:r>
-          </a:p>
-          <a:p>
-            <a:r>
-              <a:rPr lang="en-US" dirty="0">
-                <a:cs typeface="Calibri"/>
-              </a:rPr>
-              <a:t>Project explorer is where all of our current project files and folders are located, we can navigate between them there</a:t>
-            </a:r>
-          </a:p>
-          <a:p>
-            <a:r>
-              <a:rPr lang="en-US" dirty="0">
-                <a:cs typeface="Calibri"/>
-              </a:rPr>
-              <a:t>The tools are our main uses, like the console, terminal, debug section, etc.</a:t>
-            </a:r>
-          </a:p>
-          <a:p>
-            <a:r>
-              <a:rPr lang="en-US" dirty="0">
-                <a:cs typeface="Calibri"/>
-              </a:rPr>
-              <a:t>The run script section is where we run our current open script, of course our script can run our entire project, depends on what's connected to the script we are running</a:t>
-            </a:r>
-          </a:p>
-          <a:p>
+              <a:t>We can choose different environments like Virtualenv(the base one here), or Conda.</a:t>
+            </a:r>
+            <a:endParaRPr lang="en-US" dirty="0"/>
+          </a:p>
+          <a:p>
+            <a:pPr>
+              <a:defRPr/>
+            </a:pPr>
             <a:endParaRPr lang="en-US" dirty="0">
               <a:cs typeface="Calibri"/>
             </a:endParaRPr>
+          </a:p>
+          <a:p>
+            <a:pPr>
+              <a:defRPr/>
+            </a:pPr>
+            <a:r>
+              <a:rPr lang="en-US" dirty="0">
+                <a:cs typeface="Calibri"/>
+              </a:rPr>
+              <a:t>Also, we can use a new (base) interpreter or just pick one of our previously used ones if we choose so.</a:t>
+            </a:r>
+            <a:br>
+              <a:rPr lang="en-US" dirty="0">
+                <a:cs typeface="+mn-lt"/>
+              </a:rPr>
+            </a:br>
+            <a:br>
+              <a:rPr lang="en-US" dirty="0">
+                <a:cs typeface="+mn-lt"/>
+              </a:rPr>
+            </a:br>
+            <a:r>
+              <a:rPr lang="en-US" dirty="0">
+                <a:cs typeface="Calibri"/>
+              </a:rPr>
+              <a:t>For beginners this is all we need to know, we want a new interpreter </a:t>
+            </a:r>
           </a:p>
         </p:txBody>
       </p:sp>
@@ -1463,7 +1530,7 @@
     </p:spTree>
     <p:extLst>
       <p:ext uri="{BB962C8B-B14F-4D97-AF65-F5344CB8AC3E}">
-        <p14:creationId xmlns:p14="http://schemas.microsoft.com/office/powerpoint/2010/main" val="2368652420"/>
+        <p14:creationId xmlns:p14="http://schemas.microsoft.com/office/powerpoint/2010/main" val="3949587220"/>
       </p:ext>
     </p:extLst>
   </p:cSld>
@@ -1599,7 +1666,7 @@
     </p:spTree>
     <p:extLst>
       <p:ext uri="{BB962C8B-B14F-4D97-AF65-F5344CB8AC3E}">
-        <p14:creationId xmlns:p14="http://schemas.microsoft.com/office/powerpoint/2010/main" val="2292869806"/>
+        <p14:creationId xmlns:p14="http://schemas.microsoft.com/office/powerpoint/2010/main" val="2368652420"/>
       </p:ext>
     </p:extLst>
   </p:cSld>
@@ -1735,7 +1802,7 @@
     </p:spTree>
     <p:extLst>
       <p:ext uri="{BB962C8B-B14F-4D97-AF65-F5344CB8AC3E}">
-        <p14:creationId xmlns:p14="http://schemas.microsoft.com/office/powerpoint/2010/main" val="1504573229"/>
+        <p14:creationId xmlns:p14="http://schemas.microsoft.com/office/powerpoint/2010/main" val="2292869806"/>
       </p:ext>
     </p:extLst>
   </p:cSld>
@@ -1871,7 +1938,7 @@
     </p:spTree>
     <p:extLst>
       <p:ext uri="{BB962C8B-B14F-4D97-AF65-F5344CB8AC3E}">
-        <p14:creationId xmlns:p14="http://schemas.microsoft.com/office/powerpoint/2010/main" val="852432278"/>
+        <p14:creationId xmlns:p14="http://schemas.microsoft.com/office/powerpoint/2010/main" val="1504573229"/>
       </p:ext>
     </p:extLst>
   </p:cSld>
@@ -2007,7 +2074,7 @@
     </p:spTree>
     <p:extLst>
       <p:ext uri="{BB962C8B-B14F-4D97-AF65-F5344CB8AC3E}">
-        <p14:creationId xmlns:p14="http://schemas.microsoft.com/office/powerpoint/2010/main" val="418371177"/>
+        <p14:creationId xmlns:p14="http://schemas.microsoft.com/office/powerpoint/2010/main" val="852432278"/>
       </p:ext>
     </p:extLst>
   </p:cSld>
@@ -2062,18 +2129,8 @@
           <a:lstStyle/>
           <a:p>
             <a:r>
-              <a:rPr lang="en-US" dirty="0">
-                <a:cs typeface="Calibri"/>
-              </a:rPr>
-              <a:t>The Python console has two main methods: print and input.</a:t>
-            </a:r>
-          </a:p>
-          <a:p>
-            <a:r>
-              <a:rPr lang="en-US" dirty="0">
-                <a:cs typeface="Calibri"/>
-              </a:rPr>
-              <a:t>Print, like its name, prints whatever is between the brackets, sometimes things might not be printed like we think they will (like Classes instances), we will see them as we progress.</a:t>
+              <a:rPr lang="en-US" dirty="0"/>
+              <a:t>This is the main work area in PyCharm:</a:t>
             </a:r>
             <a:br>
               <a:rPr lang="en-US" dirty="0">
@@ -2084,20 +2141,45 @@
               <a:rPr lang="en-US" dirty="0">
                 <a:cs typeface="Calibri"/>
               </a:rPr>
-              <a:t>Input, like its name, receives an input from the user in the console, and we can of course use them to do different things (</a:t>
-            </a:r>
-            <a:r>
-              <a:rPr lang="en-US" b="1" dirty="0">
-                <a:cs typeface="Calibri"/>
-              </a:rPr>
-              <a:t>inputs are always of type string! Remember that!</a:t>
-            </a:r>
+              <a:t>The Coding section is where you write you code</a:t>
+            </a:r>
+          </a:p>
+          <a:p>
             <a:r>
               <a:rPr lang="en-US" dirty="0">
                 <a:cs typeface="Calibri"/>
               </a:rPr>
-              <a:t>)</a:t>
-            </a:r>
+              <a:t>Menu bar is all the options, setting etc.</a:t>
+            </a:r>
+          </a:p>
+          <a:p>
+            <a:r>
+              <a:rPr lang="en-US" dirty="0">
+                <a:cs typeface="Calibri"/>
+              </a:rPr>
+              <a:t>Project explorer is where all of our current project files and folders are located, we can navigate between them there</a:t>
+            </a:r>
+          </a:p>
+          <a:p>
+            <a:r>
+              <a:rPr lang="en-US" dirty="0">
+                <a:cs typeface="Calibri"/>
+              </a:rPr>
+              <a:t>The tools are our main uses, like the console, terminal, debug section, etc.</a:t>
+            </a:r>
+          </a:p>
+          <a:p>
+            <a:r>
+              <a:rPr lang="en-US" dirty="0">
+                <a:cs typeface="Calibri"/>
+              </a:rPr>
+              <a:t>The run script section is where we run our current open script, of course our script can run our entire project, depends on what's connected to the script we are running</a:t>
+            </a:r>
+          </a:p>
+          <a:p>
+            <a:endParaRPr lang="en-US" dirty="0">
+              <a:cs typeface="Calibri"/>
+            </a:endParaRPr>
           </a:p>
         </p:txBody>
       </p:sp>
@@ -2108,7 +2190,7 @@
             <a:spLocks noGrp="1"/>
           </p:cNvSpPr>
           <p:nvPr>
-            <p:ph type="sldNum" sz="quarter" idx="5"/>
+            <p:ph type="sldNum" sz="quarter" idx="10"/>
           </p:nvPr>
         </p:nvSpPr>
         <p:spPr/>
@@ -2119,7 +2201,7 @@
             <a:fld id="{C18343ED-3762-4D46-A439-B4D407E13EF8}" type="slidenum">
               <a:rPr lang="en-US" smtClean="0"/>
               <a:pPr/>
-              <a:t>25</a:t>
+              <a:t>22</a:t>
             </a:fld>
             <a:endParaRPr lang="en-US"/>
           </a:p>
@@ -2128,7 +2210,7 @@
     </p:spTree>
     <p:extLst>
       <p:ext uri="{BB962C8B-B14F-4D97-AF65-F5344CB8AC3E}">
-        <p14:creationId xmlns:p14="http://schemas.microsoft.com/office/powerpoint/2010/main" val="873478548"/>
+        <p14:creationId xmlns:p14="http://schemas.microsoft.com/office/powerpoint/2010/main" val="418371177"/>
       </p:ext>
     </p:extLst>
   </p:cSld>
@@ -2249,7 +2331,7 @@
     </p:spTree>
     <p:extLst>
       <p:ext uri="{BB962C8B-B14F-4D97-AF65-F5344CB8AC3E}">
-        <p14:creationId xmlns:p14="http://schemas.microsoft.com/office/powerpoint/2010/main" val="1334899561"/>
+        <p14:creationId xmlns:p14="http://schemas.microsoft.com/office/powerpoint/2010/main" val="873478548"/>
       </p:ext>
     </p:extLst>
   </p:cSld>
@@ -2476,7 +2558,128 @@
     </p:spTree>
     <p:extLst>
       <p:ext uri="{BB962C8B-B14F-4D97-AF65-F5344CB8AC3E}">
-        <p14:creationId xmlns:p14="http://schemas.microsoft.com/office/powerpoint/2010/main" val="2030585090"/>
+        <p14:creationId xmlns:p14="http://schemas.microsoft.com/office/powerpoint/2010/main" val="118421158"/>
+      </p:ext>
+    </p:extLst>
+  </p:cSld>
+  <p:clrMapOvr>
+    <a:masterClrMapping/>
+  </p:clrMapOvr>
+</p:notes>
+</file>
+
+<file path=ppt/notesSlides/notesSlide20.xml><?xml version="1.0" encoding="utf-8"?>
+<p:notes xmlns:a="http://schemas.openxmlformats.org/drawingml/2006/main" xmlns:r="http://schemas.openxmlformats.org/officeDocument/2006/relationships" xmlns:p="http://schemas.openxmlformats.org/presentationml/2006/main">
+  <p:cSld>
+    <p:spTree>
+      <p:nvGrpSpPr>
+        <p:cNvPr id="1" name=""/>
+        <p:cNvGrpSpPr/>
+        <p:nvPr/>
+      </p:nvGrpSpPr>
+      <p:grpSpPr>
+        <a:xfrm>
+          <a:off x="0" y="0"/>
+          <a:ext cx="0" cy="0"/>
+          <a:chOff x="0" y="0"/>
+          <a:chExt cx="0" cy="0"/>
+        </a:xfrm>
+      </p:grpSpPr>
+      <p:sp>
+        <p:nvSpPr>
+          <p:cNvPr id="2" name="Slide Image Placeholder 1"/>
+          <p:cNvSpPr>
+            <a:spLocks noGrp="1" noRot="1" noChangeAspect="1"/>
+          </p:cNvSpPr>
+          <p:nvPr>
+            <p:ph type="sldImg"/>
+          </p:nvPr>
+        </p:nvSpPr>
+        <p:spPr/>
+      </p:sp>
+      <p:sp>
+        <p:nvSpPr>
+          <p:cNvPr id="3" name="Notes Placeholder 2"/>
+          <p:cNvSpPr>
+            <a:spLocks noGrp="1"/>
+          </p:cNvSpPr>
+          <p:nvPr>
+            <p:ph type="body" idx="1"/>
+          </p:nvPr>
+        </p:nvSpPr>
+        <p:spPr/>
+        <p:txBody>
+          <a:bodyPr/>
+          <a:lstStyle/>
+          <a:p>
+            <a:r>
+              <a:rPr lang="en-US" dirty="0">
+                <a:cs typeface="Calibri"/>
+              </a:rPr>
+              <a:t>The Python console has two main methods: print and input.</a:t>
+            </a:r>
+          </a:p>
+          <a:p>
+            <a:r>
+              <a:rPr lang="en-US" dirty="0">
+                <a:cs typeface="Calibri"/>
+              </a:rPr>
+              <a:t>Print, like its name, prints whatever is between the brackets, sometimes things might not be printed like we think they will (like Classes instances), we will see them as we progress.</a:t>
+            </a:r>
+            <a:br>
+              <a:rPr lang="en-US" dirty="0">
+                <a:cs typeface="+mn-lt"/>
+              </a:rPr>
+            </a:br>
+            <a:r>
+              <a:rPr lang="en-US" dirty="0">
+                <a:cs typeface="Calibri"/>
+              </a:rPr>
+              <a:t>Input, like its name, receives an input from the user in the console, and we can of course use them to do different things (</a:t>
+            </a:r>
+            <a:r>
+              <a:rPr lang="en-US" b="1" dirty="0">
+                <a:cs typeface="Calibri"/>
+              </a:rPr>
+              <a:t>inputs are always of type string! Remember that!</a:t>
+            </a:r>
+            <a:r>
+              <a:rPr lang="en-US" dirty="0">
+                <a:cs typeface="Calibri"/>
+              </a:rPr>
+              <a:t>)</a:t>
+            </a:r>
+          </a:p>
+        </p:txBody>
+      </p:sp>
+      <p:sp>
+        <p:nvSpPr>
+          <p:cNvPr id="4" name="Slide Number Placeholder 3"/>
+          <p:cNvSpPr>
+            <a:spLocks noGrp="1"/>
+          </p:cNvSpPr>
+          <p:nvPr>
+            <p:ph type="sldNum" sz="quarter" idx="5"/>
+          </p:nvPr>
+        </p:nvSpPr>
+        <p:spPr/>
+        <p:txBody>
+          <a:bodyPr/>
+          <a:lstStyle/>
+          <a:p>
+            <a:fld id="{C18343ED-3762-4D46-A439-B4D407E13EF8}" type="slidenum">
+              <a:rPr lang="en-US" smtClean="0"/>
+              <a:pPr/>
+              <a:t>27</a:t>
+            </a:fld>
+            <a:endParaRPr lang="en-US"/>
+          </a:p>
+        </p:txBody>
+      </p:sp>
+    </p:spTree>
+    <p:extLst>
+      <p:ext uri="{BB962C8B-B14F-4D97-AF65-F5344CB8AC3E}">
+        <p14:creationId xmlns:p14="http://schemas.microsoft.com/office/powerpoint/2010/main" val="1334899561"/>
       </p:ext>
     </p:extLst>
   </p:cSld>
@@ -2531,123 +2734,148 @@
           <a:lstStyle/>
           <a:p>
             <a:r>
+              <a:rPr lang="en-US" dirty="0"/>
+              <a:t>Python is dynamically-typed and garbage-collected. It supports multiple programming paradigms, including structured (particularly, procedural), object-oriented and functional programming.</a:t>
+            </a:r>
+          </a:p>
+          <a:p>
+            <a:endParaRPr lang="en-US" sz="1200" dirty="0">
+              <a:cs typeface="Calibri"/>
+            </a:endParaRPr>
+          </a:p>
+          <a:p>
+            <a:r>
               <a:rPr lang="en-US" dirty="0">
-                <a:solidFill>
-                  <a:srgbClr val="000000"/>
-                </a:solidFill>
-                <a:latin typeface="Tahoma"/>
-                <a:ea typeface="Tahoma"/>
-                <a:cs typeface="Tahoma"/>
-              </a:rPr>
-              <a:t>PyCharm is currently one of the most used IDE for python development, It provides code analysis, a graphical debugger, an integrated unit tester, integration with version control systems (VCSes), and supports web development with Django as well as data science with Anaconda.</a:t>
-            </a:r>
-          </a:p>
-          <a:p>
+                <a:cs typeface="Calibri"/>
+              </a:rPr>
+              <a:t>It was built to be as readable as possible, and is </a:t>
+            </a:r>
+            <a:r>
+              <a:rPr lang="en-US" dirty="0"/>
+              <a:t>significant indentation driven (Off-side rule).</a:t>
+            </a:r>
             <a:endParaRPr lang="en-US" dirty="0">
-              <a:solidFill>
-                <a:srgbClr val="000000"/>
-              </a:solidFill>
-              <a:latin typeface="Tahoma"/>
-              <a:ea typeface="Tahoma"/>
-              <a:cs typeface="Tahoma"/>
+              <a:cs typeface="Calibri"/>
             </a:endParaRPr>
           </a:p>
           <a:p>
-            <a:r>
-              <a:rPr lang="en-US" dirty="0">
-                <a:solidFill>
-                  <a:srgbClr val="000000"/>
-                </a:solidFill>
-                <a:latin typeface="Tahoma"/>
-                <a:ea typeface="Tahoma"/>
-                <a:cs typeface="Tahoma"/>
-              </a:rPr>
-              <a:t>It was created by JetBrains</a:t>
-            </a:r>
-          </a:p>
-          <a:p>
+            <a:pPr algn="l" rtl="0" eaLnBrk="1" hangingPunct="1"/>
+            <a:endParaRPr lang="en-US"/>
+          </a:p>
+          <a:p>
+            <a:r>
+              <a:rPr lang="en-US" dirty="0"/>
+              <a:t>The language's core philosophy is summarized in the document </a:t>
+            </a:r>
+            <a:r>
+              <a:rPr lang="en-US" i="1" dirty="0"/>
+              <a:t>The Zen of Python</a:t>
+            </a:r>
+            <a:r>
+              <a:rPr lang="en-US" dirty="0"/>
+              <a:t> (</a:t>
+            </a:r>
+            <a:r>
+              <a:rPr lang="en-US" i="1" dirty="0"/>
+              <a:t>PEP 20</a:t>
+            </a:r>
+            <a:r>
+              <a:rPr lang="en-US" dirty="0"/>
+              <a:t>), which includes aphorisms such as:</a:t>
+            </a:r>
             <a:endParaRPr lang="en-US" dirty="0">
-              <a:solidFill>
-                <a:srgbClr val="000000"/>
-              </a:solidFill>
-              <a:latin typeface="Tahoma"/>
-              <a:ea typeface="Tahoma"/>
-              <a:cs typeface="Tahoma"/>
+              <a:cs typeface="Calibri"/>
             </a:endParaRPr>
           </a:p>
           <a:p>
-            <a:r>
-              <a:rPr lang="en-US" dirty="0">
-                <a:solidFill>
-                  <a:srgbClr val="000000"/>
-                </a:solidFill>
-                <a:latin typeface="Tahoma"/>
-                <a:ea typeface="Tahoma"/>
-                <a:cs typeface="Tahoma"/>
-              </a:rPr>
-              <a:t>It is mostly popular because of many things, such as:</a:t>
-            </a:r>
-          </a:p>
-          <a:p>
-            <a:pPr marL="171450" indent="-171450">
+            <a:pPr marL="285750" indent="-285750">
               <a:buFont typeface="Arial"/>
               <a:buChar char="•"/>
             </a:pPr>
             <a:r>
-              <a:rPr lang="en-US" dirty="0">
-                <a:solidFill>
-                  <a:srgbClr val="000000"/>
-                </a:solidFill>
-                <a:latin typeface="Tahoma"/>
-                <a:ea typeface="Tahoma"/>
-                <a:cs typeface="Tahoma"/>
-              </a:rPr>
-              <a:t>It is considered as an intelligent code editor, fast and safe refactoring, and smart code.</a:t>
-            </a:r>
-          </a:p>
-          <a:p>
-            <a:pPr marL="171450" indent="-171450">
+              <a:rPr lang="en-US" dirty="0"/>
+              <a:t>Beautiful is better than ugly.</a:t>
+            </a:r>
+            <a:endParaRPr lang="en-US" dirty="0">
+              <a:cs typeface="Calibri"/>
+            </a:endParaRPr>
+          </a:p>
+          <a:p>
+            <a:pPr marL="285750" indent="-285750">
               <a:buFont typeface="Arial"/>
               <a:buChar char="•"/>
             </a:pPr>
             <a:r>
-              <a:rPr lang="en-US" dirty="0">
-                <a:solidFill>
-                  <a:srgbClr val="000000"/>
-                </a:solidFill>
-                <a:latin typeface="Tahoma"/>
-                <a:ea typeface="Tahoma"/>
-                <a:cs typeface="Tahoma"/>
-              </a:rPr>
-              <a:t>Features for debugging, profiling, remote development, testing the code, auto code completion, quick fixing, error detection and tools of the database.</a:t>
-            </a:r>
-          </a:p>
-          <a:p>
-            <a:pPr marL="171450" indent="-171450">
+              <a:rPr lang="en-US" dirty="0"/>
+              <a:t>Explicit is better than implicit.</a:t>
+            </a:r>
+            <a:endParaRPr lang="en-US" dirty="0">
+              <a:cs typeface="Calibri"/>
+            </a:endParaRPr>
+          </a:p>
+          <a:p>
+            <a:pPr marL="285750" indent="-285750">
               <a:buFont typeface="Arial"/>
               <a:buChar char="•"/>
             </a:pPr>
             <a:r>
+              <a:rPr lang="en-US" dirty="0"/>
+              <a:t>Simple is better than complex.</a:t>
+            </a:r>
+            <a:endParaRPr lang="en-US" dirty="0">
+              <a:cs typeface="Calibri"/>
+            </a:endParaRPr>
+          </a:p>
+          <a:p>
+            <a:pPr marL="285750" indent="-285750">
+              <a:buFont typeface="Arial"/>
+              <a:buChar char="•"/>
+            </a:pPr>
+            <a:r>
+              <a:rPr lang="en-US" dirty="0"/>
+              <a:t>Complex is better than complicated.</a:t>
+            </a:r>
+            <a:endParaRPr lang="en-US" dirty="0">
+              <a:cs typeface="Calibri"/>
+            </a:endParaRPr>
+          </a:p>
+          <a:p>
+            <a:pPr marL="285750" indent="-285750">
+              <a:buFont typeface="Arial"/>
+              <a:buChar char="•"/>
+            </a:pPr>
+            <a:r>
+              <a:rPr lang="en-US" dirty="0"/>
+              <a:t>Readability counts.</a:t>
+            </a:r>
+            <a:endParaRPr lang="en-US" dirty="0">
+              <a:cs typeface="Calibri"/>
+            </a:endParaRPr>
+          </a:p>
+          <a:p>
+            <a:pPr algn="l"/>
+            <a:endParaRPr lang="en-US" dirty="0">
+              <a:cs typeface="Calibri"/>
+            </a:endParaRPr>
+          </a:p>
+          <a:p>
+            <a:endParaRPr lang="en-US" u="sng"/>
+          </a:p>
+          <a:p>
+            <a:pPr algn="l" rtl="0" eaLnBrk="1" hangingPunct="1"/>
+            <a:r>
+              <a:rPr lang="en-US" u="sng" dirty="0"/>
+              <a:t>For further reading:</a:t>
+            </a:r>
+          </a:p>
+          <a:p>
+            <a:r>
               <a:rPr lang="en-US" dirty="0">
-                <a:solidFill>
-                  <a:srgbClr val="000000"/>
-                </a:solidFill>
-                <a:latin typeface="Tahoma"/>
-                <a:ea typeface="Tahoma"/>
-                <a:cs typeface="Tahoma"/>
-              </a:rPr>
-              <a:t>Support for Popular web technologies, web frameworks, scientific libraries and version control. </a:t>
-            </a:r>
-          </a:p>
-          <a:p>
-            <a:endParaRPr lang="en-US" dirty="0">
-              <a:solidFill>
-                <a:srgbClr val="000000"/>
-              </a:solidFill>
-              <a:latin typeface="Tahoma"/>
-              <a:ea typeface="Tahoma"/>
-              <a:cs typeface="Tahoma"/>
-            </a:endParaRPr>
+                <a:hlinkClick r:id="rId3"/>
+              </a:rPr>
+              <a:t>Python (programming language) - Wikipedia</a:t>
+            </a:r>
+            <a:endParaRPr lang="en-US"/>
           </a:p>
         </p:txBody>
       </p:sp>
@@ -2669,7 +2897,7 @@
             <a:fld id="{C18343ED-3762-4D46-A439-B4D407E13EF8}" type="slidenum">
               <a:rPr lang="en-US" smtClean="0"/>
               <a:pPr/>
-              <a:t>7</a:t>
+              <a:t>5</a:t>
             </a:fld>
             <a:endParaRPr lang="en-US"/>
           </a:p>
@@ -2678,7 +2906,7 @@
     </p:spTree>
     <p:extLst>
       <p:ext uri="{BB962C8B-B14F-4D97-AF65-F5344CB8AC3E}">
-        <p14:creationId xmlns:p14="http://schemas.microsoft.com/office/powerpoint/2010/main" val="3013686146"/>
+        <p14:creationId xmlns:p14="http://schemas.microsoft.com/office/powerpoint/2010/main" val="2030585090"/>
       </p:ext>
     </p:extLst>
   </p:cSld>
@@ -2880,7 +3108,7 @@
     </p:spTree>
     <p:extLst>
       <p:ext uri="{BB962C8B-B14F-4D97-AF65-F5344CB8AC3E}">
-        <p14:creationId xmlns:p14="http://schemas.microsoft.com/office/powerpoint/2010/main" val="4088648762"/>
+        <p14:creationId xmlns:p14="http://schemas.microsoft.com/office/powerpoint/2010/main" val="3013686146"/>
       </p:ext>
     </p:extLst>
   </p:cSld>
@@ -3082,7 +3310,7 @@
     </p:spTree>
     <p:extLst>
       <p:ext uri="{BB962C8B-B14F-4D97-AF65-F5344CB8AC3E}">
-        <p14:creationId xmlns:p14="http://schemas.microsoft.com/office/powerpoint/2010/main" val="1157867576"/>
+        <p14:creationId xmlns:p14="http://schemas.microsoft.com/office/powerpoint/2010/main" val="4088648762"/>
       </p:ext>
     </p:extLst>
   </p:cSld>
@@ -3284,7 +3512,7 @@
     </p:spTree>
     <p:extLst>
       <p:ext uri="{BB962C8B-B14F-4D97-AF65-F5344CB8AC3E}">
-        <p14:creationId xmlns:p14="http://schemas.microsoft.com/office/powerpoint/2010/main" val="849729191"/>
+        <p14:creationId xmlns:p14="http://schemas.microsoft.com/office/powerpoint/2010/main" val="1157867576"/>
       </p:ext>
     </p:extLst>
   </p:cSld>
@@ -3486,7 +3714,7 @@
     </p:spTree>
     <p:extLst>
       <p:ext uri="{BB962C8B-B14F-4D97-AF65-F5344CB8AC3E}">
-        <p14:creationId xmlns:p14="http://schemas.microsoft.com/office/powerpoint/2010/main" val="2779813135"/>
+        <p14:creationId xmlns:p14="http://schemas.microsoft.com/office/powerpoint/2010/main" val="849729191"/>
       </p:ext>
     </p:extLst>
   </p:cSld>
@@ -3688,7 +3916,7 @@
     </p:spTree>
     <p:extLst>
       <p:ext uri="{BB962C8B-B14F-4D97-AF65-F5344CB8AC3E}">
-        <p14:creationId xmlns:p14="http://schemas.microsoft.com/office/powerpoint/2010/main" val="89710469"/>
+        <p14:creationId xmlns:p14="http://schemas.microsoft.com/office/powerpoint/2010/main" val="2779813135"/>
       </p:ext>
     </p:extLst>
   </p:cSld>
@@ -3890,7 +4118,7 @@
     </p:spTree>
     <p:extLst>
       <p:ext uri="{BB962C8B-B14F-4D97-AF65-F5344CB8AC3E}">
-        <p14:creationId xmlns:p14="http://schemas.microsoft.com/office/powerpoint/2010/main" val="925471829"/>
+        <p14:creationId xmlns:p14="http://schemas.microsoft.com/office/powerpoint/2010/main" val="89710469"/>
       </p:ext>
     </p:extLst>
   </p:cSld>
@@ -4049,7 +4277,7 @@
           <a:p>
             <a:fld id="{A9D9B7D1-305C-49A9-9D59-000E5D30F1FD}" type="datetimeFigureOut">
               <a:rPr lang="he-IL" smtClean="0"/>
-              <a:t>א'/תמוז/תשפ"ג</a:t>
+              <a:t>ט"ז/תמוז/תשפ"ג</a:t>
             </a:fld>
             <a:endParaRPr lang="he-IL"/>
           </a:p>
@@ -4249,7 +4477,7 @@
           <a:p>
             <a:fld id="{A9D9B7D1-305C-49A9-9D59-000E5D30F1FD}" type="datetimeFigureOut">
               <a:rPr lang="he-IL" smtClean="0"/>
-              <a:t>א'/תמוז/תשפ"ג</a:t>
+              <a:t>ט"ז/תמוז/תשפ"ג</a:t>
             </a:fld>
             <a:endParaRPr lang="he-IL"/>
           </a:p>
@@ -4459,7 +4687,7 @@
           <a:p>
             <a:fld id="{A9D9B7D1-305C-49A9-9D59-000E5D30F1FD}" type="datetimeFigureOut">
               <a:rPr lang="he-IL" smtClean="0"/>
-              <a:t>א'/תמוז/תשפ"ג</a:t>
+              <a:t>ט"ז/תמוז/תשפ"ג</a:t>
             </a:fld>
             <a:endParaRPr lang="he-IL"/>
           </a:p>
@@ -7028,7 +7256,7 @@
           <a:p>
             <a:fld id="{A9D9B7D1-305C-49A9-9D59-000E5D30F1FD}" type="datetimeFigureOut">
               <a:rPr lang="he-IL" smtClean="0"/>
-              <a:t>א'/תמוז/תשפ"ג</a:t>
+              <a:t>ט"ז/תמוז/תשפ"ג</a:t>
             </a:fld>
             <a:endParaRPr lang="he-IL"/>
           </a:p>
@@ -7304,7 +7532,7 @@
           <a:p>
             <a:fld id="{A9D9B7D1-305C-49A9-9D59-000E5D30F1FD}" type="datetimeFigureOut">
               <a:rPr lang="he-IL" smtClean="0"/>
-              <a:t>א'/תמוז/תשפ"ג</a:t>
+              <a:t>ט"ז/תמוז/תשפ"ג</a:t>
             </a:fld>
             <a:endParaRPr lang="he-IL"/>
           </a:p>
@@ -7572,7 +7800,7 @@
           <a:p>
             <a:fld id="{A9D9B7D1-305C-49A9-9D59-000E5D30F1FD}" type="datetimeFigureOut">
               <a:rPr lang="he-IL" smtClean="0"/>
-              <a:t>א'/תמוז/תשפ"ג</a:t>
+              <a:t>ט"ז/תמוז/תשפ"ג</a:t>
             </a:fld>
             <a:endParaRPr lang="he-IL"/>
           </a:p>
@@ -7987,7 +8215,7 @@
           <a:p>
             <a:fld id="{A9D9B7D1-305C-49A9-9D59-000E5D30F1FD}" type="datetimeFigureOut">
               <a:rPr lang="he-IL" smtClean="0"/>
-              <a:t>א'/תמוז/תשפ"ג</a:t>
+              <a:t>ט"ז/תמוז/תשפ"ג</a:t>
             </a:fld>
             <a:endParaRPr lang="he-IL"/>
           </a:p>
@@ -8129,7 +8357,7 @@
           <a:p>
             <a:fld id="{A9D9B7D1-305C-49A9-9D59-000E5D30F1FD}" type="datetimeFigureOut">
               <a:rPr lang="he-IL" smtClean="0"/>
-              <a:t>א'/תמוז/תשפ"ג</a:t>
+              <a:t>ט"ז/תמוז/תשפ"ג</a:t>
             </a:fld>
             <a:endParaRPr lang="he-IL"/>
           </a:p>
@@ -8242,7 +8470,7 @@
           <a:p>
             <a:fld id="{A9D9B7D1-305C-49A9-9D59-000E5D30F1FD}" type="datetimeFigureOut">
               <a:rPr lang="he-IL" smtClean="0"/>
-              <a:t>א'/תמוז/תשפ"ג</a:t>
+              <a:t>ט"ז/תמוז/תשפ"ג</a:t>
             </a:fld>
             <a:endParaRPr lang="he-IL"/>
           </a:p>
@@ -8555,7 +8783,7 @@
           <a:p>
             <a:fld id="{A9D9B7D1-305C-49A9-9D59-000E5D30F1FD}" type="datetimeFigureOut">
               <a:rPr lang="he-IL" smtClean="0"/>
-              <a:t>א'/תמוז/תשפ"ג</a:t>
+              <a:t>ט"ז/תמוז/תשפ"ג</a:t>
             </a:fld>
             <a:endParaRPr lang="he-IL"/>
           </a:p>
@@ -8844,7 +9072,7 @@
           <a:p>
             <a:fld id="{A9D9B7D1-305C-49A9-9D59-000E5D30F1FD}" type="datetimeFigureOut">
               <a:rPr lang="he-IL" smtClean="0"/>
-              <a:t>א'/תמוז/תשפ"ג</a:t>
+              <a:t>ט"ז/תמוז/תשפ"ג</a:t>
             </a:fld>
             <a:endParaRPr lang="he-IL"/>
           </a:p>
@@ -9087,7 +9315,7 @@
           <a:p>
             <a:fld id="{A9D9B7D1-305C-49A9-9D59-000E5D30F1FD}" type="datetimeFigureOut">
               <a:rPr lang="he-IL" smtClean="0"/>
-              <a:t>א'/תמוז/תשפ"ג</a:t>
+              <a:t>ט"ז/תמוז/תשפ"ג</a:t>
             </a:fld>
             <a:endParaRPr lang="he-IL"/>
           </a:p>
@@ -9595,78 +9823,22 @@
             </a:r>
             <a:r>
               <a:rPr lang="en-GB" dirty="0" err="1"/>
-              <a:t>RunTime</a:t>
+              <a:t>VSCode</a:t>
             </a:r>
             <a:r>
               <a:rPr lang="en-GB" dirty="0"/>
-              <a:t> extension</a:t>
+              <a:t> for Python </a:t>
             </a:r>
             <a:endParaRPr lang="en-US" dirty="0"/>
           </a:p>
         </p:txBody>
       </p:sp>
-      <p:sp>
-        <p:nvSpPr>
-          <p:cNvPr id="10" name="TextBox 9">
+      <p:pic>
+        <p:nvPicPr>
+          <p:cNvPr id="9" name="Content Placeholder 8">
             <a:extLst>
               <a:ext uri="{FF2B5EF4-FFF2-40B4-BE49-F238E27FC236}">
-                <a16:creationId xmlns:a16="http://schemas.microsoft.com/office/drawing/2014/main" id="{3497A8A4-177D-4E9C-BA15-7E47D950F550}"/>
-              </a:ext>
-            </a:extLst>
-          </p:cNvPr>
-          <p:cNvSpPr txBox="1"/>
-          <p:nvPr/>
-        </p:nvSpPr>
-        <p:spPr>
-          <a:xfrm>
-            <a:off x="762000" y="1868486"/>
-            <a:ext cx="4622800" cy="2554545"/>
-          </a:xfrm>
-          <a:prstGeom prst="rect">
-            <a:avLst/>
-          </a:prstGeom>
-          <a:noFill/>
-        </p:spPr>
-        <p:txBody>
-          <a:bodyPr wrap="square" rtlCol="0">
-            <a:spAutoFit/>
-          </a:bodyPr>
-          <a:lstStyle/>
-          <a:p>
-            <a:pPr marL="514350" indent="-514350">
-              <a:buAutoNum type="arabicPeriod"/>
-            </a:pPr>
-            <a:r>
-              <a:rPr lang="en-GB" sz="3200" dirty="0"/>
-              <a:t>Click on extension icon in navigation panel.</a:t>
-            </a:r>
-          </a:p>
-          <a:p>
-            <a:pPr marL="514350" indent="-514350">
-              <a:buAutoNum type="arabicPeriod"/>
-            </a:pPr>
-            <a:r>
-              <a:rPr lang="en-GB" sz="3200" dirty="0"/>
-              <a:t>Write in search field “code runner”.</a:t>
-            </a:r>
-          </a:p>
-          <a:p>
-            <a:pPr marL="514350" indent="-514350">
-              <a:buAutoNum type="arabicPeriod"/>
-            </a:pPr>
-            <a:r>
-              <a:rPr lang="en-GB" sz="3200" dirty="0"/>
-              <a:t>Click “Install”</a:t>
-            </a:r>
-          </a:p>
-        </p:txBody>
-      </p:sp>
-      <p:pic>
-        <p:nvPicPr>
-          <p:cNvPr id="6" name="Content Placeholder 5">
-            <a:extLst>
-              <a:ext uri="{FF2B5EF4-FFF2-40B4-BE49-F238E27FC236}">
-                <a16:creationId xmlns:a16="http://schemas.microsoft.com/office/drawing/2014/main" id="{1F79C886-5EAB-4648-8CA4-8546C15D0F83}"/>
+                <a16:creationId xmlns:a16="http://schemas.microsoft.com/office/drawing/2014/main" id="{930341CC-6F63-4EEE-9590-B3A61A4049E5}"/>
               </a:ext>
             </a:extLst>
           </p:cNvPr>
@@ -9691,17 +9863,174 @@
         </p:blipFill>
         <p:spPr>
           <a:xfrm>
-            <a:off x="5762195" y="1868486"/>
-            <a:ext cx="6027328" cy="4532314"/>
+            <a:off x="5777159" y="1868487"/>
+            <a:ext cx="6000936" cy="4515380"/>
           </a:xfrm>
         </p:spPr>
       </p:pic>
       <p:sp>
         <p:nvSpPr>
-          <p:cNvPr id="14" name="Oval 13">
+          <p:cNvPr id="10" name="TextBox 9">
             <a:extLst>
               <a:ext uri="{FF2B5EF4-FFF2-40B4-BE49-F238E27FC236}">
-                <a16:creationId xmlns:a16="http://schemas.microsoft.com/office/drawing/2014/main" id="{20EA51A2-45AE-4C65-90F0-2B22BC7D68C3}"/>
+                <a16:creationId xmlns:a16="http://schemas.microsoft.com/office/drawing/2014/main" id="{3497A8A4-177D-4E9C-BA15-7E47D950F550}"/>
+              </a:ext>
+            </a:extLst>
+          </p:cNvPr>
+          <p:cNvSpPr txBox="1"/>
+          <p:nvPr/>
+        </p:nvSpPr>
+        <p:spPr>
+          <a:xfrm>
+            <a:off x="762000" y="1868486"/>
+            <a:ext cx="4622800" cy="3046988"/>
+          </a:xfrm>
+          <a:prstGeom prst="rect">
+            <a:avLst/>
+          </a:prstGeom>
+          <a:noFill/>
+        </p:spPr>
+        <p:txBody>
+          <a:bodyPr wrap="square" rtlCol="0">
+            <a:spAutoFit/>
+          </a:bodyPr>
+          <a:lstStyle/>
+          <a:p>
+            <a:pPr marL="514350" indent="-514350">
+              <a:buAutoNum type="arabicPeriod"/>
+            </a:pPr>
+            <a:r>
+              <a:rPr lang="en-GB" sz="3200" dirty="0"/>
+              <a:t>Click on extension icon in navigation panel.</a:t>
+            </a:r>
+          </a:p>
+          <a:p>
+            <a:pPr marL="514350" indent="-514350">
+              <a:buAutoNum type="arabicPeriod"/>
+            </a:pPr>
+            <a:r>
+              <a:rPr lang="en-GB" sz="3200" dirty="0"/>
+              <a:t>Write in search field “python” to find official Python extension.</a:t>
+            </a:r>
+          </a:p>
+          <a:p>
+            <a:pPr marL="514350" indent="-514350">
+              <a:buFontTx/>
+              <a:buAutoNum type="arabicPeriod"/>
+            </a:pPr>
+            <a:r>
+              <a:rPr lang="en-GB" sz="3200" dirty="0"/>
+              <a:t>Click “Install”</a:t>
+            </a:r>
+          </a:p>
+        </p:txBody>
+      </p:sp>
+      <p:sp>
+        <p:nvSpPr>
+          <p:cNvPr id="11" name="Oval 10">
+            <a:extLst>
+              <a:ext uri="{FF2B5EF4-FFF2-40B4-BE49-F238E27FC236}">
+                <a16:creationId xmlns:a16="http://schemas.microsoft.com/office/drawing/2014/main" id="{944518BE-114D-424C-90D4-35CDFABBA0DD}"/>
+              </a:ext>
+            </a:extLst>
+          </p:cNvPr>
+          <p:cNvSpPr/>
+          <p:nvPr/>
+        </p:nvSpPr>
+        <p:spPr>
+          <a:xfrm>
+            <a:off x="8788879" y="2235200"/>
+            <a:ext cx="431800" cy="423333"/>
+          </a:xfrm>
+          <a:prstGeom prst="ellipse">
+            <a:avLst/>
+          </a:prstGeom>
+        </p:spPr>
+        <p:style>
+          <a:lnRef idx="2">
+            <a:schemeClr val="accent1">
+              <a:shade val="50000"/>
+            </a:schemeClr>
+          </a:lnRef>
+          <a:fillRef idx="1">
+            <a:schemeClr val="accent1"/>
+          </a:fillRef>
+          <a:effectRef idx="0">
+            <a:schemeClr val="accent1"/>
+          </a:effectRef>
+          <a:fontRef idx="minor">
+            <a:schemeClr val="lt1"/>
+          </a:fontRef>
+        </p:style>
+        <p:txBody>
+          <a:bodyPr rtlCol="0" anchor="ctr"/>
+          <a:lstStyle/>
+          <a:p>
+            <a:pPr algn="ctr"/>
+            <a:r>
+              <a:rPr lang="en-GB" dirty="0"/>
+              <a:t>2</a:t>
+            </a:r>
+            <a:endParaRPr lang="en-US" dirty="0"/>
+          </a:p>
+        </p:txBody>
+      </p:sp>
+      <p:sp>
+        <p:nvSpPr>
+          <p:cNvPr id="12" name="Oval 11">
+            <a:extLst>
+              <a:ext uri="{FF2B5EF4-FFF2-40B4-BE49-F238E27FC236}">
+                <a16:creationId xmlns:a16="http://schemas.microsoft.com/office/drawing/2014/main" id="{5D2DD891-2CEA-4FBF-9100-A0BCA4CBDD4B}"/>
+              </a:ext>
+            </a:extLst>
+          </p:cNvPr>
+          <p:cNvSpPr/>
+          <p:nvPr/>
+        </p:nvSpPr>
+        <p:spPr>
+          <a:xfrm>
+            <a:off x="8788879" y="2717799"/>
+            <a:ext cx="431800" cy="423333"/>
+          </a:xfrm>
+          <a:prstGeom prst="ellipse">
+            <a:avLst/>
+          </a:prstGeom>
+        </p:spPr>
+        <p:style>
+          <a:lnRef idx="2">
+            <a:schemeClr val="accent1">
+              <a:shade val="50000"/>
+            </a:schemeClr>
+          </a:lnRef>
+          <a:fillRef idx="1">
+            <a:schemeClr val="accent1"/>
+          </a:fillRef>
+          <a:effectRef idx="0">
+            <a:schemeClr val="accent1"/>
+          </a:effectRef>
+          <a:fontRef idx="minor">
+            <a:schemeClr val="lt1"/>
+          </a:fontRef>
+        </p:style>
+        <p:txBody>
+          <a:bodyPr rtlCol="0" anchor="ctr"/>
+          <a:lstStyle/>
+          <a:p>
+            <a:pPr algn="ctr"/>
+            <a:r>
+              <a:rPr lang="en-GB" dirty="0"/>
+              <a:t>3</a:t>
+            </a:r>
+            <a:endParaRPr lang="en-US" dirty="0"/>
+          </a:p>
+        </p:txBody>
+      </p:sp>
+      <p:sp>
+        <p:nvSpPr>
+          <p:cNvPr id="13" name="Oval 12">
+            <a:extLst>
+              <a:ext uri="{FF2B5EF4-FFF2-40B4-BE49-F238E27FC236}">
+                <a16:creationId xmlns:a16="http://schemas.microsoft.com/office/drawing/2014/main" id="{318C1CE2-8DC1-4A51-B529-7A88829DE8B0}"/>
               </a:ext>
             </a:extLst>
           </p:cNvPr>
@@ -9746,6 +10075,210 @@
           </a:p>
         </p:txBody>
       </p:sp>
+    </p:spTree>
+    <p:extLst>
+      <p:ext uri="{BB962C8B-B14F-4D97-AF65-F5344CB8AC3E}">
+        <p14:creationId xmlns:p14="http://schemas.microsoft.com/office/powerpoint/2010/main" val="1294030913"/>
+      </p:ext>
+    </p:extLst>
+  </p:cSld>
+  <p:clrMapOvr>
+    <a:masterClrMapping/>
+  </p:clrMapOvr>
+</p:sld>
+</file>
+
+<file path=ppt/slides/slide11.xml><?xml version="1.0" encoding="utf-8"?>
+<p:sld xmlns:a="http://schemas.openxmlformats.org/drawingml/2006/main" xmlns:r="http://schemas.openxmlformats.org/officeDocument/2006/relationships" xmlns:p="http://schemas.openxmlformats.org/presentationml/2006/main">
+  <p:cSld>
+    <p:spTree>
+      <p:nvGrpSpPr>
+        <p:cNvPr id="1" name=""/>
+        <p:cNvGrpSpPr/>
+        <p:nvPr/>
+      </p:nvGrpSpPr>
+      <p:grpSpPr>
+        <a:xfrm>
+          <a:off x="0" y="0"/>
+          <a:ext cx="0" cy="0"/>
+          <a:chOff x="0" y="0"/>
+          <a:chExt cx="0" cy="0"/>
+        </a:xfrm>
+      </p:grpSpPr>
+      <p:sp>
+        <p:nvSpPr>
+          <p:cNvPr id="2" name="Title 1"/>
+          <p:cNvSpPr>
+            <a:spLocks noGrp="1"/>
+          </p:cNvSpPr>
+          <p:nvPr>
+            <p:ph type="title"/>
+          </p:nvPr>
+        </p:nvSpPr>
+        <p:spPr/>
+        <p:txBody>
+          <a:bodyPr>
+            <a:normAutofit/>
+          </a:bodyPr>
+          <a:lstStyle/>
+          <a:p>
+            <a:r>
+              <a:rPr lang="en-GB" dirty="0"/>
+              <a:t>Setup </a:t>
+            </a:r>
+            <a:r>
+              <a:rPr lang="en-GB" dirty="0" err="1"/>
+              <a:t>RunTime</a:t>
+            </a:r>
+            <a:r>
+              <a:rPr lang="en-GB" dirty="0"/>
+              <a:t> extension</a:t>
+            </a:r>
+            <a:endParaRPr lang="en-US" dirty="0"/>
+          </a:p>
+        </p:txBody>
+      </p:sp>
+      <p:sp>
+        <p:nvSpPr>
+          <p:cNvPr id="10" name="TextBox 9">
+            <a:extLst>
+              <a:ext uri="{FF2B5EF4-FFF2-40B4-BE49-F238E27FC236}">
+                <a16:creationId xmlns:a16="http://schemas.microsoft.com/office/drawing/2014/main" id="{3497A8A4-177D-4E9C-BA15-7E47D950F550}"/>
+              </a:ext>
+            </a:extLst>
+          </p:cNvPr>
+          <p:cNvSpPr txBox="1"/>
+          <p:nvPr/>
+        </p:nvSpPr>
+        <p:spPr>
+          <a:xfrm>
+            <a:off x="762000" y="1868486"/>
+            <a:ext cx="4622800" cy="2554545"/>
+          </a:xfrm>
+          <a:prstGeom prst="rect">
+            <a:avLst/>
+          </a:prstGeom>
+          <a:noFill/>
+        </p:spPr>
+        <p:txBody>
+          <a:bodyPr wrap="square" rtlCol="0">
+            <a:spAutoFit/>
+          </a:bodyPr>
+          <a:lstStyle/>
+          <a:p>
+            <a:pPr marL="514350" indent="-514350">
+              <a:buAutoNum type="arabicPeriod"/>
+            </a:pPr>
+            <a:r>
+              <a:rPr lang="en-GB" sz="3200" dirty="0"/>
+              <a:t>Click on extension icon in navigation panel.</a:t>
+            </a:r>
+          </a:p>
+          <a:p>
+            <a:pPr marL="514350" indent="-514350">
+              <a:buAutoNum type="arabicPeriod"/>
+            </a:pPr>
+            <a:r>
+              <a:rPr lang="en-GB" sz="3200" dirty="0"/>
+              <a:t>Write in search field “code runner”.</a:t>
+            </a:r>
+          </a:p>
+          <a:p>
+            <a:pPr marL="514350" indent="-514350">
+              <a:buAutoNum type="arabicPeriod"/>
+            </a:pPr>
+            <a:r>
+              <a:rPr lang="en-GB" sz="3200" dirty="0"/>
+              <a:t>Click “Install”</a:t>
+            </a:r>
+          </a:p>
+        </p:txBody>
+      </p:sp>
+      <p:pic>
+        <p:nvPicPr>
+          <p:cNvPr id="6" name="Content Placeholder 5">
+            <a:extLst>
+              <a:ext uri="{FF2B5EF4-FFF2-40B4-BE49-F238E27FC236}">
+                <a16:creationId xmlns:a16="http://schemas.microsoft.com/office/drawing/2014/main" id="{1F79C886-5EAB-4648-8CA4-8546C15D0F83}"/>
+              </a:ext>
+            </a:extLst>
+          </p:cNvPr>
+          <p:cNvPicPr>
+            <a:picLocks noGrp="1" noChangeAspect="1"/>
+          </p:cNvPicPr>
+          <p:nvPr>
+            <p:ph idx="1"/>
+          </p:nvPr>
+        </p:nvPicPr>
+        <p:blipFill>
+          <a:blip r:embed="rId3">
+            <a:extLst>
+              <a:ext uri="{28A0092B-C50C-407E-A947-70E740481C1C}">
+                <a14:useLocalDpi xmlns:a14="http://schemas.microsoft.com/office/drawing/2010/main" val="0"/>
+              </a:ext>
+            </a:extLst>
+          </a:blip>
+          <a:stretch>
+            <a:fillRect/>
+          </a:stretch>
+        </p:blipFill>
+        <p:spPr>
+          <a:xfrm>
+            <a:off x="5762195" y="1868486"/>
+            <a:ext cx="6027328" cy="4532314"/>
+          </a:xfrm>
+        </p:spPr>
+      </p:pic>
+      <p:sp>
+        <p:nvSpPr>
+          <p:cNvPr id="14" name="Oval 13">
+            <a:extLst>
+              <a:ext uri="{FF2B5EF4-FFF2-40B4-BE49-F238E27FC236}">
+                <a16:creationId xmlns:a16="http://schemas.microsoft.com/office/drawing/2014/main" id="{20EA51A2-45AE-4C65-90F0-2B22BC7D68C3}"/>
+              </a:ext>
+            </a:extLst>
+          </p:cNvPr>
+          <p:cNvSpPr/>
+          <p:nvPr/>
+        </p:nvSpPr>
+        <p:spPr>
+          <a:xfrm>
+            <a:off x="5707012" y="4492141"/>
+            <a:ext cx="431800" cy="423333"/>
+          </a:xfrm>
+          <a:prstGeom prst="ellipse">
+            <a:avLst/>
+          </a:prstGeom>
+        </p:spPr>
+        <p:style>
+          <a:lnRef idx="2">
+            <a:schemeClr val="accent1">
+              <a:shade val="50000"/>
+            </a:schemeClr>
+          </a:lnRef>
+          <a:fillRef idx="1">
+            <a:schemeClr val="accent1"/>
+          </a:fillRef>
+          <a:effectRef idx="0">
+            <a:schemeClr val="accent1"/>
+          </a:effectRef>
+          <a:fontRef idx="minor">
+            <a:schemeClr val="lt1"/>
+          </a:fontRef>
+        </p:style>
+        <p:txBody>
+          <a:bodyPr rtlCol="0" anchor="ctr"/>
+          <a:lstStyle/>
+          <a:p>
+            <a:pPr algn="ctr"/>
+            <a:r>
+              <a:rPr lang="en-GB" dirty="0"/>
+              <a:t>1</a:t>
+            </a:r>
+            <a:endParaRPr lang="en-US" dirty="0"/>
+          </a:p>
+        </p:txBody>
+      </p:sp>
       <p:sp>
         <p:nvSpPr>
           <p:cNvPr id="15" name="Oval 14">
@@ -9859,7 +10392,7 @@
 </p:sld>
 </file>
 
-<file path=ppt/slides/slide11.xml><?xml version="1.0" encoding="utf-8"?>
+<file path=ppt/slides/slide12.xml><?xml version="1.0" encoding="utf-8"?>
 <p:sld xmlns:a="http://schemas.openxmlformats.org/drawingml/2006/main" xmlns:r="http://schemas.openxmlformats.org/officeDocument/2006/relationships" xmlns:p="http://schemas.openxmlformats.org/presentationml/2006/main">
   <p:cSld>
     <p:spTree>
@@ -10192,7 +10725,7 @@
 </p:sld>
 </file>
 
-<file path=ppt/slides/slide12.xml><?xml version="1.0" encoding="utf-8"?>
+<file path=ppt/slides/slide13.xml><?xml version="1.0" encoding="utf-8"?>
 <p:sld xmlns:a="http://schemas.openxmlformats.org/drawingml/2006/main" xmlns:r="http://schemas.openxmlformats.org/officeDocument/2006/relationships" xmlns:p="http://schemas.openxmlformats.org/presentationml/2006/main">
   <p:cSld>
     <p:spTree>
@@ -10489,100 +11022,6 @@
 </p:sld>
 </file>
 
-<file path=ppt/slides/slide13.xml><?xml version="1.0" encoding="utf-8"?>
-<p:sld xmlns:a="http://schemas.openxmlformats.org/drawingml/2006/main" xmlns:r="http://schemas.openxmlformats.org/officeDocument/2006/relationships" xmlns:p="http://schemas.openxmlformats.org/presentationml/2006/main">
-  <p:cSld>
-    <p:spTree>
-      <p:nvGrpSpPr>
-        <p:cNvPr id="1" name=""/>
-        <p:cNvGrpSpPr/>
-        <p:nvPr/>
-      </p:nvGrpSpPr>
-      <p:grpSpPr>
-        <a:xfrm>
-          <a:off x="0" y="0"/>
-          <a:ext cx="0" cy="0"/>
-          <a:chOff x="0" y="0"/>
-          <a:chExt cx="0" cy="0"/>
-        </a:xfrm>
-      </p:grpSpPr>
-      <p:sp>
-        <p:nvSpPr>
-          <p:cNvPr id="2" name="Title 1"/>
-          <p:cNvSpPr>
-            <a:spLocks noGrp="1"/>
-          </p:cNvSpPr>
-          <p:nvPr>
-            <p:ph type="title"/>
-          </p:nvPr>
-        </p:nvSpPr>
-        <p:spPr/>
-        <p:txBody>
-          <a:bodyPr>
-            <a:normAutofit/>
-          </a:bodyPr>
-          <a:lstStyle/>
-          <a:p>
-            <a:r>
-              <a:rPr lang="en-US" dirty="0"/>
-              <a:t>Python PyCharm Environment - alternative</a:t>
-            </a:r>
-          </a:p>
-        </p:txBody>
-      </p:sp>
-      <p:sp>
-        <p:nvSpPr>
-          <p:cNvPr id="3" name="Content Placeholder 2"/>
-          <p:cNvSpPr>
-            <a:spLocks noGrp="1"/>
-          </p:cNvSpPr>
-          <p:nvPr>
-            <p:ph idx="1"/>
-          </p:nvPr>
-        </p:nvSpPr>
-        <p:spPr/>
-        <p:txBody>
-          <a:bodyPr/>
-          <a:lstStyle/>
-          <a:p>
-            <a:r>
-              <a:rPr lang="en-US"/>
-              <a:t>PyCharm is an IDE for software development in Python</a:t>
-            </a:r>
-          </a:p>
-          <a:p>
-            <a:r>
-              <a:rPr lang="en-US"/>
-              <a:t>It is used and loved by many because all it’s features</a:t>
-            </a:r>
-          </a:p>
-          <a:p>
-            <a:r>
-              <a:rPr lang="en-US"/>
-              <a:t>It has easy to use and read debugger</a:t>
-            </a:r>
-          </a:p>
-          <a:p>
-            <a:pPr marL="0" indent="0">
-              <a:buNone/>
-            </a:pPr>
-            <a:endParaRPr lang="en-US"/>
-          </a:p>
-        </p:txBody>
-      </p:sp>
-    </p:spTree>
-    <p:extLst>
-      <p:ext uri="{BB962C8B-B14F-4D97-AF65-F5344CB8AC3E}">
-        <p14:creationId xmlns:p14="http://schemas.microsoft.com/office/powerpoint/2010/main" val="95739443"/>
-      </p:ext>
-    </p:extLst>
-  </p:cSld>
-  <p:clrMapOvr>
-    <a:masterClrMapping/>
-  </p:clrMapOvr>
-</p:sld>
-</file>
-
 <file path=ppt/slides/slide14.xml><?xml version="1.0" encoding="utf-8"?>
 <p:sld xmlns:a="http://schemas.openxmlformats.org/drawingml/2006/main" xmlns:r="http://schemas.openxmlformats.org/officeDocument/2006/relationships" xmlns:p="http://schemas.openxmlformats.org/presentationml/2006/main">
   <p:cSld>
@@ -10618,6 +11057,100 @@
           <a:lstStyle/>
           <a:p>
             <a:r>
+              <a:rPr lang="en-US" dirty="0"/>
+              <a:t>Python PyCharm Environment - alternative</a:t>
+            </a:r>
+          </a:p>
+        </p:txBody>
+      </p:sp>
+      <p:sp>
+        <p:nvSpPr>
+          <p:cNvPr id="3" name="Content Placeholder 2"/>
+          <p:cNvSpPr>
+            <a:spLocks noGrp="1"/>
+          </p:cNvSpPr>
+          <p:nvPr>
+            <p:ph idx="1"/>
+          </p:nvPr>
+        </p:nvSpPr>
+        <p:spPr/>
+        <p:txBody>
+          <a:bodyPr/>
+          <a:lstStyle/>
+          <a:p>
+            <a:r>
+              <a:rPr lang="en-US"/>
+              <a:t>PyCharm is an IDE for software development in Python</a:t>
+            </a:r>
+          </a:p>
+          <a:p>
+            <a:r>
+              <a:rPr lang="en-US"/>
+              <a:t>It is used and loved by many because all it’s features</a:t>
+            </a:r>
+          </a:p>
+          <a:p>
+            <a:r>
+              <a:rPr lang="en-US"/>
+              <a:t>It has easy to use and read debugger</a:t>
+            </a:r>
+          </a:p>
+          <a:p>
+            <a:pPr marL="0" indent="0">
+              <a:buNone/>
+            </a:pPr>
+            <a:endParaRPr lang="en-US"/>
+          </a:p>
+        </p:txBody>
+      </p:sp>
+    </p:spTree>
+    <p:extLst>
+      <p:ext uri="{BB962C8B-B14F-4D97-AF65-F5344CB8AC3E}">
+        <p14:creationId xmlns:p14="http://schemas.microsoft.com/office/powerpoint/2010/main" val="95739443"/>
+      </p:ext>
+    </p:extLst>
+  </p:cSld>
+  <p:clrMapOvr>
+    <a:masterClrMapping/>
+  </p:clrMapOvr>
+</p:sld>
+</file>
+
+<file path=ppt/slides/slide15.xml><?xml version="1.0" encoding="utf-8"?>
+<p:sld xmlns:a="http://schemas.openxmlformats.org/drawingml/2006/main" xmlns:r="http://schemas.openxmlformats.org/officeDocument/2006/relationships" xmlns:p="http://schemas.openxmlformats.org/presentationml/2006/main">
+  <p:cSld>
+    <p:spTree>
+      <p:nvGrpSpPr>
+        <p:cNvPr id="1" name=""/>
+        <p:cNvGrpSpPr/>
+        <p:nvPr/>
+      </p:nvGrpSpPr>
+      <p:grpSpPr>
+        <a:xfrm>
+          <a:off x="0" y="0"/>
+          <a:ext cx="0" cy="0"/>
+          <a:chOff x="0" y="0"/>
+          <a:chExt cx="0" cy="0"/>
+        </a:xfrm>
+      </p:grpSpPr>
+      <p:sp>
+        <p:nvSpPr>
+          <p:cNvPr id="2" name="Title 1"/>
+          <p:cNvSpPr>
+            <a:spLocks noGrp="1"/>
+          </p:cNvSpPr>
+          <p:nvPr>
+            <p:ph type="title"/>
+          </p:nvPr>
+        </p:nvSpPr>
+        <p:spPr/>
+        <p:txBody>
+          <a:bodyPr>
+            <a:normAutofit/>
+          </a:bodyPr>
+          <a:lstStyle/>
+          <a:p>
+            <a:r>
               <a:rPr lang="en-US" dirty="0">
                 <a:cs typeface="Times New Roman" pitchFamily="18" charset="0"/>
               </a:rPr>
@@ -10665,7 +11198,7 @@
 </p:sld>
 </file>
 
-<file path=ppt/slides/slide15.xml><?xml version="1.0" encoding="utf-8"?>
+<file path=ppt/slides/slide16.xml><?xml version="1.0" encoding="utf-8"?>
 <p:sld xmlns:a="http://schemas.openxmlformats.org/drawingml/2006/main" xmlns:r="http://schemas.openxmlformats.org/officeDocument/2006/relationships" xmlns:p="http://schemas.openxmlformats.org/presentationml/2006/main">
   <p:cSld>
     <p:spTree>
@@ -10786,7 +11319,7 @@
 </p:sld>
 </file>
 
-<file path=ppt/slides/slide16.xml><?xml version="1.0" encoding="utf-8"?>
+<file path=ppt/slides/slide17.xml><?xml version="1.0" encoding="utf-8"?>
 <p:sld xmlns:a="http://schemas.openxmlformats.org/drawingml/2006/main" xmlns:r="http://schemas.openxmlformats.org/officeDocument/2006/relationships" xmlns:p="http://schemas.openxmlformats.org/presentationml/2006/main">
   <p:cSld>
     <p:spTree>
@@ -11145,7 +11678,7 @@
 </p:sld>
 </file>
 
-<file path=ppt/slides/slide17.xml><?xml version="1.0" encoding="utf-8"?>
+<file path=ppt/slides/slide18.xml><?xml version="1.0" encoding="utf-8"?>
 <p:sld xmlns:a="http://schemas.openxmlformats.org/drawingml/2006/main" xmlns:r="http://schemas.openxmlformats.org/officeDocument/2006/relationships" xmlns:p="http://schemas.openxmlformats.org/presentationml/2006/main">
   <p:cSld>
     <p:spTree>
@@ -11836,7 +12369,7 @@
 </p:sld>
 </file>
 
-<file path=ppt/slides/slide18.xml><?xml version="1.0" encoding="utf-8"?>
+<file path=ppt/slides/slide19.xml><?xml version="1.0" encoding="utf-8"?>
 <p:sld xmlns:a="http://schemas.openxmlformats.org/drawingml/2006/main" xmlns:r="http://schemas.openxmlformats.org/officeDocument/2006/relationships" xmlns:p="http://schemas.openxmlformats.org/presentationml/2006/main">
   <p:cSld>
     <p:spTree>
@@ -11964,7 +12497,163 @@
 </p:sld>
 </file>
 
-<file path=ppt/slides/slide19.xml><?xml version="1.0" encoding="utf-8"?>
+<file path=ppt/slides/slide2.xml><?xml version="1.0" encoding="utf-8"?>
+<p:sld xmlns:a="http://schemas.openxmlformats.org/drawingml/2006/main" xmlns:r="http://schemas.openxmlformats.org/officeDocument/2006/relationships" xmlns:p="http://schemas.openxmlformats.org/presentationml/2006/main">
+  <p:cSld>
+    <p:spTree>
+      <p:nvGrpSpPr>
+        <p:cNvPr id="1" name=""/>
+        <p:cNvGrpSpPr/>
+        <p:nvPr/>
+      </p:nvGrpSpPr>
+      <p:grpSpPr>
+        <a:xfrm>
+          <a:off x="0" y="0"/>
+          <a:ext cx="0" cy="0"/>
+          <a:chOff x="0" y="0"/>
+          <a:chExt cx="0" cy="0"/>
+        </a:xfrm>
+      </p:grpSpPr>
+      <p:sp>
+        <p:nvSpPr>
+          <p:cNvPr id="5" name="Text Placeholder 4"/>
+          <p:cNvSpPr>
+            <a:spLocks noGrp="1"/>
+          </p:cNvSpPr>
+          <p:nvPr>
+            <p:ph type="body" sz="quarter" idx="13"/>
+          </p:nvPr>
+        </p:nvSpPr>
+        <p:spPr/>
+        <p:txBody>
+          <a:bodyPr/>
+          <a:lstStyle/>
+          <a:p>
+            <a:pPr>
+              <a:lnSpc>
+                <a:spcPct val="100000"/>
+              </a:lnSpc>
+            </a:pPr>
+            <a:r>
+              <a:rPr lang="en-US" dirty="0"/>
+              <a:t>What is Python?</a:t>
+            </a:r>
+          </a:p>
+          <a:p>
+            <a:pPr>
+              <a:lnSpc>
+                <a:spcPct val="100000"/>
+              </a:lnSpc>
+            </a:pPr>
+            <a:r>
+              <a:rPr lang="en-US" dirty="0"/>
+              <a:t>Growth of python</a:t>
+            </a:r>
+          </a:p>
+          <a:p>
+            <a:pPr>
+              <a:lnSpc>
+                <a:spcPct val="100000"/>
+              </a:lnSpc>
+            </a:pPr>
+            <a:r>
+              <a:rPr lang="en-US" dirty="0"/>
+              <a:t>Python – Getting Started</a:t>
+            </a:r>
+          </a:p>
+          <a:p>
+            <a:pPr>
+              <a:lnSpc>
+                <a:spcPct val="100000"/>
+              </a:lnSpc>
+            </a:pPr>
+            <a:r>
+              <a:rPr lang="en-US" dirty="0"/>
+              <a:t>Python is interpreted language</a:t>
+            </a:r>
+          </a:p>
+          <a:p>
+            <a:pPr>
+              <a:lnSpc>
+                <a:spcPct val="100000"/>
+              </a:lnSpc>
+            </a:pPr>
+            <a:r>
+              <a:rPr lang="en-US" dirty="0"/>
+              <a:t>Python first program</a:t>
+            </a:r>
+          </a:p>
+          <a:p>
+            <a:pPr>
+              <a:lnSpc>
+                <a:spcPct val="100000"/>
+              </a:lnSpc>
+            </a:pPr>
+            <a:r>
+              <a:rPr lang="en-US" dirty="0"/>
+              <a:t>Indentations</a:t>
+            </a:r>
+          </a:p>
+          <a:p>
+            <a:pPr>
+              <a:lnSpc>
+                <a:spcPct val="100000"/>
+              </a:lnSpc>
+            </a:pPr>
+            <a:r>
+              <a:rPr lang="en-US" dirty="0"/>
+              <a:t>Error Messages</a:t>
+            </a:r>
+          </a:p>
+          <a:p>
+            <a:pPr algn="l">
+              <a:lnSpc>
+                <a:spcPct val="150000"/>
+              </a:lnSpc>
+              <a:buFont typeface="Arial" panose="020B0604020202020204" pitchFamily="34" charset="0"/>
+              <a:buChar char="•"/>
+            </a:pPr>
+            <a:endParaRPr lang="en-US" dirty="0"/>
+          </a:p>
+        </p:txBody>
+      </p:sp>
+      <p:sp>
+        <p:nvSpPr>
+          <p:cNvPr id="3" name="Title 2"/>
+          <p:cNvSpPr>
+            <a:spLocks noGrp="1"/>
+          </p:cNvSpPr>
+          <p:nvPr>
+            <p:ph type="title"/>
+          </p:nvPr>
+        </p:nvSpPr>
+        <p:spPr/>
+        <p:txBody>
+          <a:bodyPr/>
+          <a:lstStyle/>
+          <a:p>
+            <a:r>
+              <a:rPr lang="en-US"/>
+              <a:t>Agenda</a:t>
+            </a:r>
+            <a:endParaRPr lang="he-IL"/>
+          </a:p>
+        </p:txBody>
+      </p:sp>
+    </p:spTree>
+    <p:extLst>
+      <p:ext uri="{BB962C8B-B14F-4D97-AF65-F5344CB8AC3E}">
+        <p14:creationId xmlns:p14="http://schemas.microsoft.com/office/powerpoint/2010/main" val="4243087197"/>
+      </p:ext>
+    </p:extLst>
+  </p:cSld>
+  <p:clrMapOvr>
+    <a:masterClrMapping/>
+  </p:clrMapOvr>
+</p:sld>
+</file>
+
+<file path=ppt/slides/slide20.xml><?xml version="1.0" encoding="utf-8"?>
 <p:sld xmlns:a="http://schemas.openxmlformats.org/drawingml/2006/main" xmlns:r="http://schemas.openxmlformats.org/officeDocument/2006/relationships" xmlns:p="http://schemas.openxmlformats.org/presentationml/2006/main">
   <p:cSld>
     <p:spTree>
@@ -12268,152 +12957,7 @@
 </p:sld>
 </file>
 
-<file path=ppt/slides/slide2.xml><?xml version="1.0" encoding="utf-8"?>
-<p:sld xmlns:a="http://schemas.openxmlformats.org/drawingml/2006/main" xmlns:r="http://schemas.openxmlformats.org/officeDocument/2006/relationships" xmlns:p="http://schemas.openxmlformats.org/presentationml/2006/main">
-  <p:cSld>
-    <p:spTree>
-      <p:nvGrpSpPr>
-        <p:cNvPr id="1" name=""/>
-        <p:cNvGrpSpPr/>
-        <p:nvPr/>
-      </p:nvGrpSpPr>
-      <p:grpSpPr>
-        <a:xfrm>
-          <a:off x="0" y="0"/>
-          <a:ext cx="0" cy="0"/>
-          <a:chOff x="0" y="0"/>
-          <a:chExt cx="0" cy="0"/>
-        </a:xfrm>
-      </p:grpSpPr>
-      <p:sp>
-        <p:nvSpPr>
-          <p:cNvPr id="5" name="Text Placeholder 4"/>
-          <p:cNvSpPr>
-            <a:spLocks noGrp="1"/>
-          </p:cNvSpPr>
-          <p:nvPr>
-            <p:ph type="body" sz="quarter" idx="13"/>
-          </p:nvPr>
-        </p:nvSpPr>
-        <p:spPr/>
-        <p:txBody>
-          <a:bodyPr/>
-          <a:lstStyle/>
-          <a:p>
-            <a:pPr>
-              <a:lnSpc>
-                <a:spcPct val="100000"/>
-              </a:lnSpc>
-            </a:pPr>
-            <a:r>
-              <a:rPr lang="en-US" dirty="0"/>
-              <a:t>What is Python?</a:t>
-            </a:r>
-          </a:p>
-          <a:p>
-            <a:pPr>
-              <a:lnSpc>
-                <a:spcPct val="100000"/>
-              </a:lnSpc>
-            </a:pPr>
-            <a:r>
-              <a:rPr lang="en-US" dirty="0"/>
-              <a:t>Python – Getting Started</a:t>
-            </a:r>
-          </a:p>
-          <a:p>
-            <a:pPr>
-              <a:lnSpc>
-                <a:spcPct val="100000"/>
-              </a:lnSpc>
-            </a:pPr>
-            <a:r>
-              <a:rPr lang="en-US" dirty="0"/>
-              <a:t>Python is interpreted language</a:t>
-            </a:r>
-          </a:p>
-          <a:p>
-            <a:pPr>
-              <a:lnSpc>
-                <a:spcPct val="100000"/>
-              </a:lnSpc>
-            </a:pPr>
-            <a:r>
-              <a:rPr lang="en-US" dirty="0"/>
-              <a:t>Python first program</a:t>
-            </a:r>
-          </a:p>
-          <a:p>
-            <a:pPr>
-              <a:lnSpc>
-                <a:spcPct val="100000"/>
-              </a:lnSpc>
-            </a:pPr>
-            <a:r>
-              <a:rPr lang="en-US" dirty="0"/>
-              <a:t>Indentations</a:t>
-            </a:r>
-          </a:p>
-          <a:p>
-            <a:pPr>
-              <a:lnSpc>
-                <a:spcPct val="100000"/>
-              </a:lnSpc>
-            </a:pPr>
-            <a:r>
-              <a:rPr lang="en-US" dirty="0"/>
-              <a:t>Error Messages</a:t>
-            </a:r>
-          </a:p>
-          <a:p>
-            <a:pPr algn="l">
-              <a:lnSpc>
-                <a:spcPct val="150000"/>
-              </a:lnSpc>
-              <a:buFont typeface="Arial" panose="020B0604020202020204" pitchFamily="34" charset="0"/>
-              <a:buChar char="•"/>
-            </a:pPr>
-            <a:endParaRPr lang="en-US" dirty="0"/>
-          </a:p>
-        </p:txBody>
-      </p:sp>
-      <p:sp>
-        <p:nvSpPr>
-          <p:cNvPr id="3" name="Title 2"/>
-          <p:cNvSpPr>
-            <a:spLocks noGrp="1"/>
-          </p:cNvSpPr>
-          <p:nvPr>
-            <p:ph type="title"/>
-          </p:nvPr>
-        </p:nvSpPr>
-        <p:spPr/>
-        <p:txBody>
-          <a:bodyPr/>
-          <a:lstStyle/>
-          <a:p>
-            <a:r>
-              <a:rPr lang="en-US"/>
-              <a:t>Agenda</a:t>
-            </a:r>
-            <a:endParaRPr lang="he-IL"/>
-          </a:p>
-        </p:txBody>
-      </p:sp>
-    </p:spTree>
-    <p:extLst>
-      <p:ext uri="{BB962C8B-B14F-4D97-AF65-F5344CB8AC3E}">
-        <p14:creationId xmlns:p14="http://schemas.microsoft.com/office/powerpoint/2010/main" val="4243087197"/>
-      </p:ext>
-    </p:extLst>
-  </p:cSld>
-  <p:clrMapOvr>
-    <a:masterClrMapping/>
-  </p:clrMapOvr>
-</p:sld>
-</file>
-
-<file path=ppt/slides/slide20.xml><?xml version="1.0" encoding="utf-8"?>
+<file path=ppt/slides/slide21.xml><?xml version="1.0" encoding="utf-8"?>
 <p:sld xmlns:a="http://schemas.openxmlformats.org/drawingml/2006/main" xmlns:r="http://schemas.openxmlformats.org/officeDocument/2006/relationships" xmlns:p="http://schemas.openxmlformats.org/presentationml/2006/main">
   <p:cSld>
     <p:spTree>
@@ -12618,7 +13162,7 @@
 </p:sld>
 </file>
 
-<file path=ppt/slides/slide21.xml><?xml version="1.0" encoding="utf-8"?>
+<file path=ppt/slides/slide22.xml><?xml version="1.0" encoding="utf-8"?>
 <p:sld xmlns:a="http://schemas.openxmlformats.org/drawingml/2006/main" xmlns:r="http://schemas.openxmlformats.org/officeDocument/2006/relationships" xmlns:p="http://schemas.openxmlformats.org/presentationml/2006/main">
   <p:cSld>
     <p:spTree>
@@ -12794,7 +13338,7 @@
 </p:sld>
 </file>
 
-<file path=ppt/slides/slide22.xml><?xml version="1.0" encoding="utf-8"?>
+<file path=ppt/slides/slide23.xml><?xml version="1.0" encoding="utf-8"?>
 <p:sld xmlns:a="http://schemas.openxmlformats.org/drawingml/2006/main" xmlns:r="http://schemas.openxmlformats.org/officeDocument/2006/relationships" xmlns:p="http://schemas.openxmlformats.org/presentationml/2006/main">
   <p:cSld>
     <p:spTree>
@@ -12847,7 +13391,7 @@
 </p:sld>
 </file>
 
-<file path=ppt/slides/slide23.xml><?xml version="1.0" encoding="utf-8"?>
+<file path=ppt/slides/slide24.xml><?xml version="1.0" encoding="utf-8"?>
 <p:sld xmlns:a="http://schemas.openxmlformats.org/drawingml/2006/main" xmlns:r="http://schemas.openxmlformats.org/officeDocument/2006/relationships" xmlns:p="http://schemas.openxmlformats.org/presentationml/2006/main">
   <p:cSld>
     <p:spTree>
@@ -13071,7 +13615,7 @@
 </p:sld>
 </file>
 
-<file path=ppt/slides/slide24.xml><?xml version="1.0" encoding="utf-8"?>
+<file path=ppt/slides/slide25.xml><?xml version="1.0" encoding="utf-8"?>
 <p:sld xmlns:a="http://schemas.openxmlformats.org/drawingml/2006/main" xmlns:r="http://schemas.openxmlformats.org/officeDocument/2006/relationships" xmlns:p="http://schemas.openxmlformats.org/presentationml/2006/main">
   <p:cSld>
     <p:spTree>
@@ -13124,7 +13668,7 @@
 </p:sld>
 </file>
 
-<file path=ppt/slides/slide25.xml><?xml version="1.0" encoding="utf-8"?>
+<file path=ppt/slides/slide26.xml><?xml version="1.0" encoding="utf-8"?>
 <p:sld xmlns:a="http://schemas.openxmlformats.org/drawingml/2006/main" xmlns:r="http://schemas.openxmlformats.org/officeDocument/2006/relationships" xmlns:p="http://schemas.openxmlformats.org/presentationml/2006/main">
   <p:cSld>
     <p:spTree>
@@ -13744,7 +14288,7 @@
 </p:sld>
 </file>
 
-<file path=ppt/slides/slide26.xml><?xml version="1.0" encoding="utf-8"?>
+<file path=ppt/slides/slide27.xml><?xml version="1.0" encoding="utf-8"?>
 <p:sld xmlns:a="http://schemas.openxmlformats.org/drawingml/2006/main" xmlns:r="http://schemas.openxmlformats.org/officeDocument/2006/relationships" xmlns:p="http://schemas.openxmlformats.org/presentationml/2006/main">
   <p:cSld>
     <p:spTree>
@@ -14386,107 +14930,6 @@
 </p:sld>
 </file>
 
-<file path=ppt/slides/slide27.xml><?xml version="1.0" encoding="utf-8"?>
-<p:sld xmlns:a="http://schemas.openxmlformats.org/drawingml/2006/main" xmlns:r="http://schemas.openxmlformats.org/officeDocument/2006/relationships" xmlns:p="http://schemas.openxmlformats.org/presentationml/2006/main">
-  <p:cSld>
-    <p:spTree>
-      <p:nvGrpSpPr>
-        <p:cNvPr id="1" name=""/>
-        <p:cNvGrpSpPr/>
-        <p:nvPr/>
-      </p:nvGrpSpPr>
-      <p:grpSpPr>
-        <a:xfrm>
-          <a:off x="0" y="0"/>
-          <a:ext cx="0" cy="0"/>
-          <a:chOff x="0" y="0"/>
-          <a:chExt cx="0" cy="0"/>
-        </a:xfrm>
-      </p:grpSpPr>
-      <p:sp>
-        <p:nvSpPr>
-          <p:cNvPr id="6" name="Text Placeholder 5"/>
-          <p:cNvSpPr>
-            <a:spLocks noGrp="1"/>
-          </p:cNvSpPr>
-          <p:nvPr>
-            <p:ph type="body" sz="quarter" idx="13"/>
-          </p:nvPr>
-        </p:nvSpPr>
-        <p:spPr/>
-        <p:txBody>
-          <a:bodyPr/>
-          <a:lstStyle/>
-          <a:p>
-            <a:r>
-              <a:rPr lang="en-US" dirty="0"/>
-              <a:t>The Python programming language is an easy to read-write language</a:t>
-            </a:r>
-          </a:p>
-          <a:p>
-            <a:r>
-              <a:rPr lang="en-US" dirty="0"/>
-              <a:t>Python is now gaining more and more popularity (creating jobs demands)</a:t>
-            </a:r>
-          </a:p>
-          <a:p>
-            <a:r>
-              <a:rPr lang="en-US" dirty="0" err="1"/>
-              <a:t>VSCode</a:t>
-            </a:r>
-            <a:r>
-              <a:rPr lang="en-US" dirty="0"/>
-              <a:t> is one of the most used IDE’s for Python</a:t>
-            </a:r>
-          </a:p>
-          <a:p>
-            <a:r>
-              <a:rPr lang="en-US" dirty="0" err="1"/>
-              <a:t>VSCode</a:t>
-            </a:r>
-            <a:r>
-              <a:rPr lang="en-US" dirty="0"/>
-              <a:t> has built in debugger and console</a:t>
-            </a:r>
-          </a:p>
-        </p:txBody>
-      </p:sp>
-      <p:sp>
-        <p:nvSpPr>
-          <p:cNvPr id="7" name="Title 6"/>
-          <p:cNvSpPr>
-            <a:spLocks noGrp="1"/>
-          </p:cNvSpPr>
-          <p:nvPr>
-            <p:ph type="title"/>
-          </p:nvPr>
-        </p:nvSpPr>
-        <p:spPr/>
-        <p:txBody>
-          <a:bodyPr/>
-          <a:lstStyle/>
-          <a:p>
-            <a:r>
-              <a:rPr lang="en-US"/>
-              <a:t>Summary</a:t>
-            </a:r>
-            <a:endParaRPr lang="he-IL"/>
-          </a:p>
-        </p:txBody>
-      </p:sp>
-    </p:spTree>
-    <p:extLst>
-      <p:ext uri="{BB962C8B-B14F-4D97-AF65-F5344CB8AC3E}">
-        <p14:creationId xmlns:p14="http://schemas.microsoft.com/office/powerpoint/2010/main" val="3974120008"/>
-      </p:ext>
-    </p:extLst>
-  </p:cSld>
-  <p:clrMapOvr>
-    <a:masterClrMapping/>
-  </p:clrMapOvr>
-</p:sld>
-</file>
-
 <file path=ppt/slides/slide28.xml><?xml version="1.0" encoding="utf-8"?>
 <p:sld xmlns:a="http://schemas.openxmlformats.org/drawingml/2006/main" xmlns:r="http://schemas.openxmlformats.org/officeDocument/2006/relationships" xmlns:p="http://schemas.openxmlformats.org/presentationml/2006/main">
   <p:cSld>
@@ -14506,6 +14949,107 @@
       </p:grpSpPr>
       <p:sp>
         <p:nvSpPr>
+          <p:cNvPr id="6" name="Text Placeholder 5"/>
+          <p:cNvSpPr>
+            <a:spLocks noGrp="1"/>
+          </p:cNvSpPr>
+          <p:nvPr>
+            <p:ph type="body" sz="quarter" idx="13"/>
+          </p:nvPr>
+        </p:nvSpPr>
+        <p:spPr/>
+        <p:txBody>
+          <a:bodyPr/>
+          <a:lstStyle/>
+          <a:p>
+            <a:r>
+              <a:rPr lang="en-US" dirty="0"/>
+              <a:t>The Python programming language is an easy to read-write language</a:t>
+            </a:r>
+          </a:p>
+          <a:p>
+            <a:r>
+              <a:rPr lang="en-US" dirty="0"/>
+              <a:t>Python is now gaining more and more popularity (creating jobs demands)</a:t>
+            </a:r>
+          </a:p>
+          <a:p>
+            <a:r>
+              <a:rPr lang="en-US" dirty="0" err="1"/>
+              <a:t>VSCode</a:t>
+            </a:r>
+            <a:r>
+              <a:rPr lang="en-US" dirty="0"/>
+              <a:t> is one of the most used IDE’s for Python</a:t>
+            </a:r>
+          </a:p>
+          <a:p>
+            <a:r>
+              <a:rPr lang="en-US" dirty="0" err="1"/>
+              <a:t>VSCode</a:t>
+            </a:r>
+            <a:r>
+              <a:rPr lang="en-US" dirty="0"/>
+              <a:t> has built in debugger and console</a:t>
+            </a:r>
+          </a:p>
+        </p:txBody>
+      </p:sp>
+      <p:sp>
+        <p:nvSpPr>
+          <p:cNvPr id="7" name="Title 6"/>
+          <p:cNvSpPr>
+            <a:spLocks noGrp="1"/>
+          </p:cNvSpPr>
+          <p:nvPr>
+            <p:ph type="title"/>
+          </p:nvPr>
+        </p:nvSpPr>
+        <p:spPr/>
+        <p:txBody>
+          <a:bodyPr/>
+          <a:lstStyle/>
+          <a:p>
+            <a:r>
+              <a:rPr lang="en-US"/>
+              <a:t>Summary</a:t>
+            </a:r>
+            <a:endParaRPr lang="he-IL"/>
+          </a:p>
+        </p:txBody>
+      </p:sp>
+    </p:spTree>
+    <p:extLst>
+      <p:ext uri="{BB962C8B-B14F-4D97-AF65-F5344CB8AC3E}">
+        <p14:creationId xmlns:p14="http://schemas.microsoft.com/office/powerpoint/2010/main" val="3974120008"/>
+      </p:ext>
+    </p:extLst>
+  </p:cSld>
+  <p:clrMapOvr>
+    <a:masterClrMapping/>
+  </p:clrMapOvr>
+</p:sld>
+</file>
+
+<file path=ppt/slides/slide29.xml><?xml version="1.0" encoding="utf-8"?>
+<p:sld xmlns:a="http://schemas.openxmlformats.org/drawingml/2006/main" xmlns:r="http://schemas.openxmlformats.org/officeDocument/2006/relationships" xmlns:p="http://schemas.openxmlformats.org/presentationml/2006/main">
+  <p:cSld>
+    <p:spTree>
+      <p:nvGrpSpPr>
+        <p:cNvPr id="1" name=""/>
+        <p:cNvGrpSpPr/>
+        <p:nvPr/>
+      </p:nvGrpSpPr>
+      <p:grpSpPr>
+        <a:xfrm>
+          <a:off x="0" y="0"/>
+          <a:ext cx="0" cy="0"/>
+          <a:chOff x="0" y="0"/>
+          <a:chExt cx="0" cy="0"/>
+        </a:xfrm>
+      </p:grpSpPr>
+      <p:sp>
+        <p:nvSpPr>
           <p:cNvPr id="3" name="Title 2"/>
           <p:cNvSpPr>
             <a:spLocks noGrp="1"/>
@@ -14540,7 +15084,341 @@
 </p:sld>
 </file>
 
-<file path=ppt/slides/slide29.xml><?xml version="1.0" encoding="utf-8"?>
+<file path=ppt/slides/slide3.xml><?xml version="1.0" encoding="utf-8"?>
+<p:sld xmlns:a="http://schemas.openxmlformats.org/drawingml/2006/main" xmlns:r="http://schemas.openxmlformats.org/officeDocument/2006/relationships" xmlns:p="http://schemas.openxmlformats.org/presentationml/2006/main">
+  <p:cSld>
+    <p:spTree>
+      <p:nvGrpSpPr>
+        <p:cNvPr id="1" name=""/>
+        <p:cNvGrpSpPr/>
+        <p:nvPr/>
+      </p:nvGrpSpPr>
+      <p:grpSpPr>
+        <a:xfrm>
+          <a:off x="0" y="0"/>
+          <a:ext cx="0" cy="0"/>
+          <a:chOff x="0" y="0"/>
+          <a:chExt cx="0" cy="0"/>
+        </a:xfrm>
+      </p:grpSpPr>
+      <p:sp>
+        <p:nvSpPr>
+          <p:cNvPr id="2" name="Title 1"/>
+          <p:cNvSpPr>
+            <a:spLocks noGrp="1"/>
+          </p:cNvSpPr>
+          <p:nvPr>
+            <p:ph type="title"/>
+          </p:nvPr>
+        </p:nvSpPr>
+        <p:spPr/>
+        <p:txBody>
+          <a:bodyPr/>
+          <a:lstStyle/>
+          <a:p>
+            <a:r>
+              <a:rPr lang="en-US" dirty="0"/>
+              <a:t>What is Python?</a:t>
+            </a:r>
+            <a:endParaRPr lang="he-IL" dirty="0"/>
+          </a:p>
+        </p:txBody>
+      </p:sp>
+      <p:sp>
+        <p:nvSpPr>
+          <p:cNvPr id="3" name="Content Placeholder 2"/>
+          <p:cNvSpPr>
+            <a:spLocks noGrp="1"/>
+          </p:cNvSpPr>
+          <p:nvPr>
+            <p:ph idx="1"/>
+          </p:nvPr>
+        </p:nvSpPr>
+        <p:spPr>
+          <a:xfrm>
+            <a:off x="838200" y="1690688"/>
+            <a:ext cx="10515600" cy="4486275"/>
+          </a:xfrm>
+        </p:spPr>
+        <p:txBody>
+          <a:bodyPr>
+            <a:normAutofit/>
+          </a:bodyPr>
+          <a:lstStyle/>
+          <a:p>
+            <a:pPr marL="0" indent="0" algn="l" rtl="0" fontAlgn="base">
+              <a:buNone/>
+            </a:pPr>
+            <a:r>
+              <a:rPr lang="en-US" b="0" i="0" u="none" strike="noStrike" dirty="0">
+                <a:solidFill>
+                  <a:srgbClr val="000000"/>
+                </a:solidFill>
+                <a:effectLst/>
+                <a:latin typeface="Calibri" panose="020F0502020204030204" pitchFamily="34" charset="0"/>
+              </a:rPr>
+              <a:t>• Python is a widely used, interactive, general purpose interpreted language</a:t>
+            </a:r>
+            <a:r>
+              <a:rPr lang="ru-RU" b="0" i="0" dirty="0">
+                <a:solidFill>
+                  <a:srgbClr val="000000"/>
+                </a:solidFill>
+                <a:effectLst/>
+                <a:latin typeface="Calibri" panose="020F0502020204030204" pitchFamily="34" charset="0"/>
+              </a:rPr>
+              <a:t>​</a:t>
+            </a:r>
+            <a:endParaRPr lang="ru-RU" b="0" i="0" dirty="0">
+              <a:solidFill>
+                <a:srgbClr val="000000"/>
+              </a:solidFill>
+              <a:effectLst/>
+              <a:latin typeface="Segoe UI" panose="020B0502040204020203" pitchFamily="34" charset="0"/>
+            </a:endParaRPr>
+          </a:p>
+          <a:p>
+            <a:pPr marL="0" indent="0" algn="l" rtl="0" fontAlgn="base">
+              <a:buNone/>
+            </a:pPr>
+            <a:r>
+              <a:rPr lang="en-US" b="0" i="0" u="none" strike="noStrike" dirty="0">
+                <a:solidFill>
+                  <a:srgbClr val="000000"/>
+                </a:solidFill>
+                <a:effectLst/>
+                <a:latin typeface="Calibri" panose="020F0502020204030204" pitchFamily="34" charset="0"/>
+              </a:rPr>
+              <a:t>• Python is stable, cross platform programming language </a:t>
+            </a:r>
+            <a:r>
+              <a:rPr lang="en-US" b="0" i="0" dirty="0">
+                <a:solidFill>
+                  <a:srgbClr val="000000"/>
+                </a:solidFill>
+                <a:effectLst/>
+                <a:latin typeface="Calibri" panose="020F0502020204030204" pitchFamily="34" charset="0"/>
+              </a:rPr>
+              <a:t>​</a:t>
+            </a:r>
+            <a:endParaRPr lang="en-US" b="0" i="0" dirty="0">
+              <a:solidFill>
+                <a:srgbClr val="000000"/>
+              </a:solidFill>
+              <a:effectLst/>
+              <a:latin typeface="Segoe UI" panose="020B0502040204020203" pitchFamily="34" charset="0"/>
+            </a:endParaRPr>
+          </a:p>
+          <a:p>
+            <a:pPr marL="0" indent="0" algn="l" rtl="0" fontAlgn="base">
+              <a:buNone/>
+            </a:pPr>
+            <a:r>
+              <a:rPr lang="en-US" b="0" i="0" u="none" strike="noStrike" dirty="0">
+                <a:solidFill>
+                  <a:srgbClr val="000000"/>
+                </a:solidFill>
+                <a:effectLst/>
+                <a:latin typeface="Calibri" panose="020F0502020204030204" pitchFamily="34" charset="0"/>
+              </a:rPr>
+              <a:t>• Python is a high level and object-oriented programming language  </a:t>
+            </a:r>
+            <a:r>
+              <a:rPr lang="en-US" b="0" i="0" dirty="0">
+                <a:solidFill>
+                  <a:srgbClr val="000000"/>
+                </a:solidFill>
+                <a:effectLst/>
+                <a:latin typeface="Calibri" panose="020F0502020204030204" pitchFamily="34" charset="0"/>
+              </a:rPr>
+              <a:t>​</a:t>
+            </a:r>
+            <a:endParaRPr lang="en-US" b="0" i="0" dirty="0">
+              <a:solidFill>
+                <a:srgbClr val="000000"/>
+              </a:solidFill>
+              <a:effectLst/>
+              <a:latin typeface="Segoe UI" panose="020B0502040204020203" pitchFamily="34" charset="0"/>
+            </a:endParaRPr>
+          </a:p>
+          <a:p>
+            <a:pPr marL="0" indent="0" algn="l" rtl="0" fontAlgn="base">
+              <a:buNone/>
+            </a:pPr>
+            <a:r>
+              <a:rPr lang="en-US" b="0" i="0" u="none" strike="noStrike" dirty="0">
+                <a:solidFill>
+                  <a:srgbClr val="000000"/>
+                </a:solidFill>
+                <a:effectLst/>
+                <a:latin typeface="Calibri" panose="020F0502020204030204" pitchFamily="34" charset="0"/>
+              </a:rPr>
+              <a:t>• Python is an Open Source software, distributed under a liberal license</a:t>
+            </a:r>
+            <a:r>
+              <a:rPr lang="en-US" b="0" i="0" dirty="0">
+                <a:solidFill>
+                  <a:srgbClr val="000000"/>
+                </a:solidFill>
+                <a:effectLst/>
+                <a:latin typeface="Calibri" panose="020F0502020204030204" pitchFamily="34" charset="0"/>
+              </a:rPr>
+              <a:t>​</a:t>
+            </a:r>
+            <a:endParaRPr lang="en-US" b="0" i="0" dirty="0">
+              <a:solidFill>
+                <a:srgbClr val="000000"/>
+              </a:solidFill>
+              <a:effectLst/>
+              <a:latin typeface="Segoe UI" panose="020B0502040204020203" pitchFamily="34" charset="0"/>
+            </a:endParaRPr>
+          </a:p>
+          <a:p>
+            <a:pPr marL="0" indent="0" algn="l" rtl="0" fontAlgn="base">
+              <a:buNone/>
+            </a:pPr>
+            <a:r>
+              <a:rPr lang="en-US" b="0" i="0" u="none" strike="noStrike" dirty="0">
+                <a:solidFill>
+                  <a:srgbClr val="000000"/>
+                </a:solidFill>
+                <a:effectLst/>
+                <a:latin typeface="Calibri" panose="020F0502020204030204" pitchFamily="34" charset="0"/>
+              </a:rPr>
+              <a:t>• Python is simple, intuitive, dynamic  and is easy to read and understand</a:t>
+            </a:r>
+            <a:r>
+              <a:rPr lang="en-US" b="0" i="0" dirty="0">
+                <a:solidFill>
+                  <a:srgbClr val="000000"/>
+                </a:solidFill>
+                <a:effectLst/>
+                <a:latin typeface="Calibri" panose="020F0502020204030204" pitchFamily="34" charset="0"/>
+              </a:rPr>
+              <a:t>​</a:t>
+            </a:r>
+            <a:endParaRPr lang="en-US" b="0" i="0" dirty="0">
+              <a:solidFill>
+                <a:srgbClr val="000000"/>
+              </a:solidFill>
+              <a:effectLst/>
+              <a:latin typeface="Segoe UI" panose="020B0502040204020203" pitchFamily="34" charset="0"/>
+            </a:endParaRPr>
+          </a:p>
+          <a:p>
+            <a:pPr marL="0" indent="0" algn="l" rtl="0" fontAlgn="base">
+              <a:buNone/>
+            </a:pPr>
+            <a:r>
+              <a:rPr lang="en-US" b="0" i="0" u="none" strike="noStrike" dirty="0">
+                <a:solidFill>
+                  <a:srgbClr val="000000"/>
+                </a:solidFill>
+                <a:effectLst/>
+                <a:latin typeface="Calibri" panose="020F0502020204030204" pitchFamily="34" charset="0"/>
+              </a:rPr>
+              <a:t>• Designed by Guido Rossum in the late eighties </a:t>
+            </a:r>
+            <a:r>
+              <a:rPr lang="en-US" b="0" i="0" dirty="0">
+                <a:solidFill>
+                  <a:srgbClr val="000000"/>
+                </a:solidFill>
+                <a:effectLst/>
+                <a:latin typeface="Calibri" panose="020F0502020204030204" pitchFamily="34" charset="0"/>
+              </a:rPr>
+              <a:t>​</a:t>
+            </a:r>
+            <a:endParaRPr lang="en-US" b="0" i="0" dirty="0">
+              <a:solidFill>
+                <a:srgbClr val="000000"/>
+              </a:solidFill>
+              <a:effectLst/>
+              <a:latin typeface="Segoe UI" panose="020B0502040204020203" pitchFamily="34" charset="0"/>
+            </a:endParaRPr>
+          </a:p>
+        </p:txBody>
+      </p:sp>
+      <p:pic>
+        <p:nvPicPr>
+          <p:cNvPr id="5" name="Picture 4">
+            <a:extLst>
+              <a:ext uri="{FF2B5EF4-FFF2-40B4-BE49-F238E27FC236}">
+                <a16:creationId xmlns:a16="http://schemas.microsoft.com/office/drawing/2014/main" id="{14EDB199-BF58-4CED-B9BF-BC71F89996B2}"/>
+              </a:ext>
+            </a:extLst>
+          </p:cNvPr>
+          <p:cNvPicPr>
+            <a:picLocks noChangeAspect="1"/>
+          </p:cNvPicPr>
+          <p:nvPr/>
+        </p:nvPicPr>
+        <p:blipFill>
+          <a:blip r:embed="rId3"/>
+          <a:stretch>
+            <a:fillRect/>
+          </a:stretch>
+        </p:blipFill>
+        <p:spPr>
+          <a:xfrm>
+            <a:off x="9989840" y="4336432"/>
+            <a:ext cx="1497496" cy="2002901"/>
+          </a:xfrm>
+          <a:prstGeom prst="rect">
+            <a:avLst/>
+          </a:prstGeom>
+        </p:spPr>
+      </p:pic>
+      <p:sp>
+        <p:nvSpPr>
+          <p:cNvPr id="6" name="TextBox 5">
+            <a:extLst>
+              <a:ext uri="{FF2B5EF4-FFF2-40B4-BE49-F238E27FC236}">
+                <a16:creationId xmlns:a16="http://schemas.microsoft.com/office/drawing/2014/main" id="{BBC8551E-88AA-4482-8328-5258F591A550}"/>
+              </a:ext>
+            </a:extLst>
+          </p:cNvPr>
+          <p:cNvSpPr txBox="1"/>
+          <p:nvPr/>
+        </p:nvSpPr>
+        <p:spPr>
+          <a:xfrm>
+            <a:off x="9827581" y="6347534"/>
+            <a:ext cx="2068497" cy="369332"/>
+          </a:xfrm>
+          <a:prstGeom prst="rect">
+            <a:avLst/>
+          </a:prstGeom>
+          <a:noFill/>
+        </p:spPr>
+        <p:txBody>
+          <a:bodyPr wrap="square" rtlCol="0">
+            <a:spAutoFit/>
+          </a:bodyPr>
+          <a:lstStyle/>
+          <a:p>
+            <a:r>
+              <a:rPr lang="en-GB" dirty="0"/>
+              <a:t>Guido van Rossum</a:t>
+            </a:r>
+            <a:endParaRPr lang="en-US" dirty="0"/>
+          </a:p>
+        </p:txBody>
+      </p:sp>
+    </p:spTree>
+    <p:extLst>
+      <p:ext uri="{BB962C8B-B14F-4D97-AF65-F5344CB8AC3E}">
+        <p14:creationId xmlns:p14="http://schemas.microsoft.com/office/powerpoint/2010/main" val="89284741"/>
+      </p:ext>
+    </p:extLst>
+  </p:cSld>
+  <p:clrMapOvr>
+    <a:masterClrMapping/>
+  </p:clrMapOvr>
+</p:sld>
+</file>
+
+<file path=ppt/slides/slide30.xml><?xml version="1.0" encoding="utf-8"?>
 <p:sld xmlns:a="http://schemas.openxmlformats.org/drawingml/2006/main" xmlns:r="http://schemas.openxmlformats.org/officeDocument/2006/relationships" xmlns:p="http://schemas.openxmlformats.org/presentationml/2006/main">
   <p:cSld>
     <p:spTree>
@@ -14570,274 +15448,6 @@
 </p:sld>
 </file>
 
-<file path=ppt/slides/slide3.xml><?xml version="1.0" encoding="utf-8"?>
-<p:sld xmlns:a="http://schemas.openxmlformats.org/drawingml/2006/main" xmlns:r="http://schemas.openxmlformats.org/officeDocument/2006/relationships" xmlns:p="http://schemas.openxmlformats.org/presentationml/2006/main">
-  <p:cSld>
-    <p:spTree>
-      <p:nvGrpSpPr>
-        <p:cNvPr id="1" name=""/>
-        <p:cNvGrpSpPr/>
-        <p:nvPr/>
-      </p:nvGrpSpPr>
-      <p:grpSpPr>
-        <a:xfrm>
-          <a:off x="0" y="0"/>
-          <a:ext cx="0" cy="0"/>
-          <a:chOff x="0" y="0"/>
-          <a:chExt cx="0" cy="0"/>
-        </a:xfrm>
-      </p:grpSpPr>
-      <p:sp>
-        <p:nvSpPr>
-          <p:cNvPr id="2" name="Title 1"/>
-          <p:cNvSpPr>
-            <a:spLocks noGrp="1"/>
-          </p:cNvSpPr>
-          <p:nvPr>
-            <p:ph type="title"/>
-          </p:nvPr>
-        </p:nvSpPr>
-        <p:spPr/>
-        <p:txBody>
-          <a:bodyPr/>
-          <a:lstStyle/>
-          <a:p>
-            <a:r>
-              <a:rPr lang="en-US" dirty="0"/>
-              <a:t>What is Python?</a:t>
-            </a:r>
-            <a:endParaRPr lang="he-IL" dirty="0"/>
-          </a:p>
-        </p:txBody>
-      </p:sp>
-      <p:sp>
-        <p:nvSpPr>
-          <p:cNvPr id="3" name="Content Placeholder 2"/>
-          <p:cNvSpPr>
-            <a:spLocks noGrp="1"/>
-          </p:cNvSpPr>
-          <p:nvPr>
-            <p:ph idx="1"/>
-          </p:nvPr>
-        </p:nvSpPr>
-        <p:spPr>
-          <a:xfrm>
-            <a:off x="838200" y="1690688"/>
-            <a:ext cx="10515600" cy="4486275"/>
-          </a:xfrm>
-        </p:spPr>
-        <p:txBody>
-          <a:bodyPr>
-            <a:normAutofit/>
-          </a:bodyPr>
-          <a:lstStyle/>
-          <a:p>
-            <a:pPr marL="0" indent="0" algn="l" rtl="0" fontAlgn="base">
-              <a:buNone/>
-            </a:pPr>
-            <a:r>
-              <a:rPr lang="en-US" b="0" i="0" u="none" strike="noStrike" dirty="0">
-                <a:solidFill>
-                  <a:srgbClr val="000000"/>
-                </a:solidFill>
-                <a:effectLst/>
-                <a:latin typeface="Calibri" panose="020F0502020204030204" pitchFamily="34" charset="0"/>
-              </a:rPr>
-              <a:t>• Python is a widely used, interactive, general purpose interpreted language</a:t>
-            </a:r>
-            <a:r>
-              <a:rPr lang="ru-RU" b="0" i="0" dirty="0">
-                <a:solidFill>
-                  <a:srgbClr val="000000"/>
-                </a:solidFill>
-                <a:effectLst/>
-                <a:latin typeface="Calibri" panose="020F0502020204030204" pitchFamily="34" charset="0"/>
-              </a:rPr>
-              <a:t>​</a:t>
-            </a:r>
-            <a:endParaRPr lang="ru-RU" b="0" i="0" dirty="0">
-              <a:solidFill>
-                <a:srgbClr val="000000"/>
-              </a:solidFill>
-              <a:effectLst/>
-              <a:latin typeface="Segoe UI" panose="020B0502040204020203" pitchFamily="34" charset="0"/>
-            </a:endParaRPr>
-          </a:p>
-          <a:p>
-            <a:pPr marL="0" indent="0" algn="l" rtl="0" fontAlgn="base">
-              <a:buNone/>
-            </a:pPr>
-            <a:r>
-              <a:rPr lang="en-US" b="0" i="0" u="none" strike="noStrike" dirty="0">
-                <a:solidFill>
-                  <a:srgbClr val="000000"/>
-                </a:solidFill>
-                <a:effectLst/>
-                <a:latin typeface="Calibri" panose="020F0502020204030204" pitchFamily="34" charset="0"/>
-              </a:rPr>
-              <a:t>• Python is stable, cross platform programming language </a:t>
-            </a:r>
-            <a:r>
-              <a:rPr lang="en-US" b="0" i="0" dirty="0">
-                <a:solidFill>
-                  <a:srgbClr val="000000"/>
-                </a:solidFill>
-                <a:effectLst/>
-                <a:latin typeface="Calibri" panose="020F0502020204030204" pitchFamily="34" charset="0"/>
-              </a:rPr>
-              <a:t>​</a:t>
-            </a:r>
-            <a:endParaRPr lang="en-US" b="0" i="0" dirty="0">
-              <a:solidFill>
-                <a:srgbClr val="000000"/>
-              </a:solidFill>
-              <a:effectLst/>
-              <a:latin typeface="Segoe UI" panose="020B0502040204020203" pitchFamily="34" charset="0"/>
-            </a:endParaRPr>
-          </a:p>
-          <a:p>
-            <a:pPr marL="0" indent="0" algn="l" rtl="0" fontAlgn="base">
-              <a:buNone/>
-            </a:pPr>
-            <a:r>
-              <a:rPr lang="en-US" b="0" i="0" u="none" strike="noStrike" dirty="0">
-                <a:solidFill>
-                  <a:srgbClr val="000000"/>
-                </a:solidFill>
-                <a:effectLst/>
-                <a:latin typeface="Calibri" panose="020F0502020204030204" pitchFamily="34" charset="0"/>
-              </a:rPr>
-              <a:t>• Python is a high level and object-oriented programming language  </a:t>
-            </a:r>
-            <a:r>
-              <a:rPr lang="en-US" b="0" i="0" dirty="0">
-                <a:solidFill>
-                  <a:srgbClr val="000000"/>
-                </a:solidFill>
-                <a:effectLst/>
-                <a:latin typeface="Calibri" panose="020F0502020204030204" pitchFamily="34" charset="0"/>
-              </a:rPr>
-              <a:t>​</a:t>
-            </a:r>
-            <a:endParaRPr lang="en-US" b="0" i="0" dirty="0">
-              <a:solidFill>
-                <a:srgbClr val="000000"/>
-              </a:solidFill>
-              <a:effectLst/>
-              <a:latin typeface="Segoe UI" panose="020B0502040204020203" pitchFamily="34" charset="0"/>
-            </a:endParaRPr>
-          </a:p>
-          <a:p>
-            <a:pPr marL="0" indent="0" algn="l" rtl="0" fontAlgn="base">
-              <a:buNone/>
-            </a:pPr>
-            <a:r>
-              <a:rPr lang="en-US" b="0" i="0" u="none" strike="noStrike" dirty="0">
-                <a:solidFill>
-                  <a:srgbClr val="000000"/>
-                </a:solidFill>
-                <a:effectLst/>
-                <a:latin typeface="Calibri" panose="020F0502020204030204" pitchFamily="34" charset="0"/>
-              </a:rPr>
-              <a:t>• Python is an Open Source software, distributed under a liberal license</a:t>
-            </a:r>
-            <a:r>
-              <a:rPr lang="en-US" b="0" i="0" dirty="0">
-                <a:solidFill>
-                  <a:srgbClr val="000000"/>
-                </a:solidFill>
-                <a:effectLst/>
-                <a:latin typeface="Calibri" panose="020F0502020204030204" pitchFamily="34" charset="0"/>
-              </a:rPr>
-              <a:t>​</a:t>
-            </a:r>
-            <a:endParaRPr lang="en-US" b="0" i="0" dirty="0">
-              <a:solidFill>
-                <a:srgbClr val="000000"/>
-              </a:solidFill>
-              <a:effectLst/>
-              <a:latin typeface="Segoe UI" panose="020B0502040204020203" pitchFamily="34" charset="0"/>
-            </a:endParaRPr>
-          </a:p>
-          <a:p>
-            <a:pPr marL="0" indent="0" algn="l" rtl="0" fontAlgn="base">
-              <a:buNone/>
-            </a:pPr>
-            <a:r>
-              <a:rPr lang="en-US" b="0" i="0" u="none" strike="noStrike" dirty="0">
-                <a:solidFill>
-                  <a:srgbClr val="000000"/>
-                </a:solidFill>
-                <a:effectLst/>
-                <a:latin typeface="Calibri" panose="020F0502020204030204" pitchFamily="34" charset="0"/>
-              </a:rPr>
-              <a:t>• Python is simple, intuitive, dynamic  and is easy to read and understand</a:t>
-            </a:r>
-            <a:r>
-              <a:rPr lang="en-US" b="0" i="0" dirty="0">
-                <a:solidFill>
-                  <a:srgbClr val="000000"/>
-                </a:solidFill>
-                <a:effectLst/>
-                <a:latin typeface="Calibri" panose="020F0502020204030204" pitchFamily="34" charset="0"/>
-              </a:rPr>
-              <a:t>​</a:t>
-            </a:r>
-            <a:endParaRPr lang="en-US" b="0" i="0" dirty="0">
-              <a:solidFill>
-                <a:srgbClr val="000000"/>
-              </a:solidFill>
-              <a:effectLst/>
-              <a:latin typeface="Segoe UI" panose="020B0502040204020203" pitchFamily="34" charset="0"/>
-            </a:endParaRPr>
-          </a:p>
-          <a:p>
-            <a:pPr marL="0" indent="0" algn="l" rtl="0" fontAlgn="base">
-              <a:buNone/>
-            </a:pPr>
-            <a:r>
-              <a:rPr lang="en-US" b="0" i="0" u="none" strike="noStrike" dirty="0">
-                <a:solidFill>
-                  <a:srgbClr val="000000"/>
-                </a:solidFill>
-                <a:effectLst/>
-                <a:latin typeface="Calibri" panose="020F0502020204030204" pitchFamily="34" charset="0"/>
-              </a:rPr>
-              <a:t>• Designed by Guido Rossum in the late eighties </a:t>
-            </a:r>
-            <a:r>
-              <a:rPr lang="en-US" b="0" i="0" dirty="0">
-                <a:solidFill>
-                  <a:srgbClr val="000000"/>
-                </a:solidFill>
-                <a:effectLst/>
-                <a:latin typeface="Calibri" panose="020F0502020204030204" pitchFamily="34" charset="0"/>
-              </a:rPr>
-              <a:t>​</a:t>
-            </a:r>
-            <a:endParaRPr lang="en-US" b="0" i="0" dirty="0">
-              <a:solidFill>
-                <a:srgbClr val="000000"/>
-              </a:solidFill>
-              <a:effectLst/>
-              <a:latin typeface="Segoe UI" panose="020B0502040204020203" pitchFamily="34" charset="0"/>
-            </a:endParaRPr>
-          </a:p>
-        </p:txBody>
-      </p:sp>
-    </p:spTree>
-    <p:extLst>
-      <p:ext uri="{BB962C8B-B14F-4D97-AF65-F5344CB8AC3E}">
-        <p14:creationId xmlns:p14="http://schemas.microsoft.com/office/powerpoint/2010/main" val="89284741"/>
-      </p:ext>
-    </p:extLst>
-  </p:cSld>
-  <p:clrMapOvr>
-    <a:masterClrMapping/>
-  </p:clrMapOvr>
-</p:sld>
-</file>
-
 <file path=ppt/slides/slide4.xml><?xml version="1.0" encoding="utf-8"?>
 <p:sld xmlns:a="http://schemas.openxmlformats.org/drawingml/2006/main" xmlns:r="http://schemas.openxmlformats.org/officeDocument/2006/relationships" xmlns:p="http://schemas.openxmlformats.org/presentationml/2006/main">
   <p:cSld>
@@ -14867,6 +15477,166 @@
         </p:nvSpPr>
         <p:spPr/>
         <p:txBody>
+          <a:bodyPr/>
+          <a:lstStyle/>
+          <a:p>
+            <a:r>
+              <a:rPr lang="en-US" dirty="0"/>
+              <a:t>Growth of Python</a:t>
+            </a:r>
+            <a:endParaRPr lang="he-IL" dirty="0"/>
+          </a:p>
+        </p:txBody>
+      </p:sp>
+      <p:pic>
+        <p:nvPicPr>
+          <p:cNvPr id="1026" name="Picture 2" descr="The Incredible Growth of Python | Stack Overflow">
+            <a:extLst>
+              <a:ext uri="{FF2B5EF4-FFF2-40B4-BE49-F238E27FC236}">
+                <a16:creationId xmlns:a16="http://schemas.microsoft.com/office/drawing/2014/main" id="{3444D197-4FF7-4BE2-9E2D-56C3891C9EBD}"/>
+              </a:ext>
+            </a:extLst>
+          </p:cNvPr>
+          <p:cNvPicPr>
+            <a:picLocks noChangeAspect="1" noChangeArrowheads="1"/>
+          </p:cNvPicPr>
+          <p:nvPr/>
+        </p:nvPicPr>
+        <p:blipFill>
+          <a:blip r:embed="rId3">
+            <a:extLst>
+              <a:ext uri="{28A0092B-C50C-407E-A947-70E740481C1C}">
+                <a14:useLocalDpi xmlns:a14="http://schemas.microsoft.com/office/drawing/2010/main" val="0"/>
+              </a:ext>
+            </a:extLst>
+          </a:blip>
+          <a:srcRect/>
+          <a:stretch>
+            <a:fillRect/>
+          </a:stretch>
+        </p:blipFill>
+        <p:spPr bwMode="auto">
+          <a:xfrm>
+            <a:off x="499109" y="1690688"/>
+            <a:ext cx="6792320" cy="4426027"/>
+          </a:xfrm>
+          <a:prstGeom prst="rect">
+            <a:avLst/>
+          </a:prstGeom>
+          <a:noFill/>
+          <a:extLst>
+            <a:ext uri="{909E8E84-426E-40DD-AFC4-6F175D3DCCD1}">
+              <a14:hiddenFill xmlns:a14="http://schemas.microsoft.com/office/drawing/2010/main">
+                <a:solidFill>
+                  <a:srgbClr val="FFFFFF"/>
+                </a:solidFill>
+              </a14:hiddenFill>
+            </a:ext>
+          </a:extLst>
+        </p:spPr>
+      </p:pic>
+      <p:pic>
+        <p:nvPicPr>
+          <p:cNvPr id="9" name="Picture 8">
+            <a:extLst>
+              <a:ext uri="{FF2B5EF4-FFF2-40B4-BE49-F238E27FC236}">
+                <a16:creationId xmlns:a16="http://schemas.microsoft.com/office/drawing/2014/main" id="{CC6389E7-BA7B-4EFA-882E-E7582455671A}"/>
+              </a:ext>
+            </a:extLst>
+          </p:cNvPr>
+          <p:cNvPicPr>
+            <a:picLocks noChangeAspect="1"/>
+          </p:cNvPicPr>
+          <p:nvPr/>
+        </p:nvPicPr>
+        <p:blipFill>
+          <a:blip r:embed="rId4"/>
+          <a:stretch>
+            <a:fillRect/>
+          </a:stretch>
+        </p:blipFill>
+        <p:spPr>
+          <a:xfrm>
+            <a:off x="8204610" y="332178"/>
+            <a:ext cx="3061152" cy="3124341"/>
+          </a:xfrm>
+          <a:prstGeom prst="rect">
+            <a:avLst/>
+          </a:prstGeom>
+        </p:spPr>
+      </p:pic>
+      <p:pic>
+        <p:nvPicPr>
+          <p:cNvPr id="11" name="Picture 10">
+            <a:extLst>
+              <a:ext uri="{FF2B5EF4-FFF2-40B4-BE49-F238E27FC236}">
+                <a16:creationId xmlns:a16="http://schemas.microsoft.com/office/drawing/2014/main" id="{83FEC434-AA61-4771-8FBC-2D1C7570C25A}"/>
+              </a:ext>
+            </a:extLst>
+          </p:cNvPr>
+          <p:cNvPicPr>
+            <a:picLocks noChangeAspect="1"/>
+          </p:cNvPicPr>
+          <p:nvPr/>
+        </p:nvPicPr>
+        <p:blipFill>
+          <a:blip r:embed="rId5"/>
+          <a:stretch>
+            <a:fillRect/>
+          </a:stretch>
+        </p:blipFill>
+        <p:spPr>
+          <a:xfrm>
+            <a:off x="8204610" y="3318569"/>
+            <a:ext cx="3061152" cy="3207253"/>
+          </a:xfrm>
+          <a:prstGeom prst="rect">
+            <a:avLst/>
+          </a:prstGeom>
+        </p:spPr>
+      </p:pic>
+    </p:spTree>
+    <p:extLst>
+      <p:ext uri="{BB962C8B-B14F-4D97-AF65-F5344CB8AC3E}">
+        <p14:creationId xmlns:p14="http://schemas.microsoft.com/office/powerpoint/2010/main" val="3155352744"/>
+      </p:ext>
+    </p:extLst>
+  </p:cSld>
+  <p:clrMapOvr>
+    <a:masterClrMapping/>
+  </p:clrMapOvr>
+</p:sld>
+</file>
+
+<file path=ppt/slides/slide5.xml><?xml version="1.0" encoding="utf-8"?>
+<p:sld xmlns:a="http://schemas.openxmlformats.org/drawingml/2006/main" xmlns:r="http://schemas.openxmlformats.org/officeDocument/2006/relationships" xmlns:p="http://schemas.openxmlformats.org/presentationml/2006/main">
+  <p:cSld>
+    <p:spTree>
+      <p:nvGrpSpPr>
+        <p:cNvPr id="1" name=""/>
+        <p:cNvGrpSpPr/>
+        <p:nvPr/>
+      </p:nvGrpSpPr>
+      <p:grpSpPr>
+        <a:xfrm>
+          <a:off x="0" y="0"/>
+          <a:ext cx="0" cy="0"/>
+          <a:chOff x="0" y="0"/>
+          <a:chExt cx="0" cy="0"/>
+        </a:xfrm>
+      </p:grpSpPr>
+      <p:sp>
+        <p:nvSpPr>
+          <p:cNvPr id="2" name="Title 1"/>
+          <p:cNvSpPr>
+            <a:spLocks noGrp="1"/>
+          </p:cNvSpPr>
+          <p:nvPr>
+            <p:ph type="title"/>
+          </p:nvPr>
+        </p:nvSpPr>
+        <p:spPr/>
+        <p:txBody>
           <a:bodyPr>
             <a:normAutofit/>
           </a:bodyPr>
@@ -15224,7 +15994,7 @@
 </p:sld>
 </file>
 
-<file path=ppt/slides/slide5.xml><?xml version="1.0" encoding="utf-8"?>
+<file path=ppt/slides/slide6.xml><?xml version="1.0" encoding="utf-8"?>
 <p:sld xmlns:a="http://schemas.openxmlformats.org/drawingml/2006/main" xmlns:r="http://schemas.openxmlformats.org/officeDocument/2006/relationships" xmlns:p="http://schemas.openxmlformats.org/presentationml/2006/main">
   <p:cSld>
     <p:spTree>
@@ -15393,7 +16163,7 @@
 </p:sld>
 </file>
 
-<file path=ppt/slides/slide6.xml><?xml version="1.0" encoding="utf-8"?>
+<file path=ppt/slides/slide7.xml><?xml version="1.0" encoding="utf-8"?>
 <p:sld xmlns:a="http://schemas.openxmlformats.org/drawingml/2006/main" xmlns:r="http://schemas.openxmlformats.org/officeDocument/2006/relationships" xmlns:p="http://schemas.openxmlformats.org/presentationml/2006/main">
   <p:cSld>
     <p:spTree>
@@ -15573,138 +16343,6 @@
 </p:sld>
 </file>
 
-<file path=ppt/slides/slide7.xml><?xml version="1.0" encoding="utf-8"?>
-<p:sld xmlns:a="http://schemas.openxmlformats.org/drawingml/2006/main" xmlns:r="http://schemas.openxmlformats.org/officeDocument/2006/relationships" xmlns:p="http://schemas.openxmlformats.org/presentationml/2006/main">
-  <p:cSld>
-    <p:spTree>
-      <p:nvGrpSpPr>
-        <p:cNvPr id="1" name=""/>
-        <p:cNvGrpSpPr/>
-        <p:nvPr/>
-      </p:nvGrpSpPr>
-      <p:grpSpPr>
-        <a:xfrm>
-          <a:off x="0" y="0"/>
-          <a:ext cx="0" cy="0"/>
-          <a:chOff x="0" y="0"/>
-          <a:chExt cx="0" cy="0"/>
-        </a:xfrm>
-      </p:grpSpPr>
-      <p:sp>
-        <p:nvSpPr>
-          <p:cNvPr id="2" name="Title 1"/>
-          <p:cNvSpPr>
-            <a:spLocks noGrp="1"/>
-          </p:cNvSpPr>
-          <p:nvPr>
-            <p:ph type="title"/>
-          </p:nvPr>
-        </p:nvSpPr>
-        <p:spPr/>
-        <p:txBody>
-          <a:bodyPr>
-            <a:normAutofit/>
-          </a:bodyPr>
-          <a:lstStyle/>
-          <a:p>
-            <a:r>
-              <a:rPr lang="en-US" dirty="0"/>
-              <a:t>Python </a:t>
-            </a:r>
-            <a:r>
-              <a:rPr lang="en-US" dirty="0" err="1"/>
-              <a:t>VSCode</a:t>
-            </a:r>
-            <a:r>
-              <a:rPr lang="en-US" dirty="0"/>
-              <a:t> Environment</a:t>
-            </a:r>
-          </a:p>
-        </p:txBody>
-      </p:sp>
-      <p:sp>
-        <p:nvSpPr>
-          <p:cNvPr id="3" name="Content Placeholder 2"/>
-          <p:cNvSpPr>
-            <a:spLocks noGrp="1"/>
-          </p:cNvSpPr>
-          <p:nvPr>
-            <p:ph idx="1"/>
-          </p:nvPr>
-        </p:nvSpPr>
-        <p:spPr/>
-        <p:txBody>
-          <a:bodyPr>
-            <a:normAutofit fontScale="92500" lnSpcReduction="10000"/>
-          </a:bodyPr>
-          <a:lstStyle/>
-          <a:p>
-            <a:pPr marL="0" indent="0">
-              <a:buNone/>
-            </a:pPr>
-            <a:endParaRPr lang="en-US" dirty="0"/>
-          </a:p>
-          <a:p>
-            <a:r>
-              <a:rPr lang="en-US" dirty="0" err="1"/>
-              <a:t>VSCode</a:t>
-            </a:r>
-            <a:r>
-              <a:rPr lang="en-US" dirty="0"/>
-              <a:t> is a popular code editor with extensive Python support, offering features like code completion, debugging, and an integrated terminal.</a:t>
-            </a:r>
-          </a:p>
-          <a:p>
-            <a:pPr marL="0" indent="0">
-              <a:buNone/>
-            </a:pPr>
-            <a:endParaRPr lang="en-US" dirty="0"/>
-          </a:p>
-          <a:p>
-            <a:r>
-              <a:rPr lang="en-US" dirty="0"/>
-              <a:t>With its vast extension ecosystem, </a:t>
-            </a:r>
-            <a:r>
-              <a:rPr lang="en-US" dirty="0" err="1"/>
-              <a:t>VSCode</a:t>
-            </a:r>
-            <a:r>
-              <a:rPr lang="en-US" dirty="0"/>
-              <a:t> allows developers to customize and enhance their Python development experience to suit their specific needs.</a:t>
-            </a:r>
-          </a:p>
-          <a:p>
-            <a:pPr marL="0" indent="0">
-              <a:buNone/>
-            </a:pPr>
-            <a:endParaRPr lang="en-US" dirty="0"/>
-          </a:p>
-          <a:p>
-            <a:r>
-              <a:rPr lang="en-US" dirty="0" err="1"/>
-              <a:t>VSCode's</a:t>
-            </a:r>
-            <a:r>
-              <a:rPr lang="en-US" dirty="0"/>
-              <a:t> cross-platform compatibility and lightweight design make it a flexible choice for Python developers seeking a versatile and efficient coding environment.</a:t>
-            </a:r>
-          </a:p>
-        </p:txBody>
-      </p:sp>
-    </p:spTree>
-    <p:extLst>
-      <p:ext uri="{BB962C8B-B14F-4D97-AF65-F5344CB8AC3E}">
-        <p14:creationId xmlns:p14="http://schemas.microsoft.com/office/powerpoint/2010/main" val="2304337233"/>
-      </p:ext>
-    </p:extLst>
-  </p:cSld>
-  <p:clrMapOvr>
-    <a:masterClrMapping/>
-  </p:clrMapOvr>
-</p:sld>
-</file>
-
 <file path=ppt/slides/slide8.xml><?xml version="1.0" encoding="utf-8"?>
 <p:sld xmlns:a="http://schemas.openxmlformats.org/drawingml/2006/main" xmlns:r="http://schemas.openxmlformats.org/officeDocument/2006/relationships" xmlns:p="http://schemas.openxmlformats.org/presentationml/2006/main">
   <p:cSld>
@@ -15741,15 +16379,16 @@
           <a:p>
             <a:r>
               <a:rPr lang="en-US" dirty="0"/>
-              <a:t>Download Visual Studio Code</a:t>
-            </a:r>
-            <a:endParaRPr lang="en-US" i="0" dirty="0">
-              <a:solidFill>
-                <a:srgbClr val="242424"/>
-              </a:solidFill>
-              <a:effectLst/>
-              <a:latin typeface="Segoe UI" panose="020B0502040204020203" pitchFamily="34" charset="0"/>
-            </a:endParaRPr>
+              <a:t>Python </a:t>
+            </a:r>
+            <a:r>
+              <a:rPr lang="en-US" dirty="0" err="1"/>
+              <a:t>VSCode</a:t>
+            </a:r>
+            <a:r>
+              <a:rPr lang="en-US" dirty="0"/>
+              <a:t> Environment</a:t>
+            </a:r>
           </a:p>
         </p:txBody>
       </p:sp>
@@ -15766,16 +16405,59 @@
         <p:spPr/>
         <p:txBody>
           <a:bodyPr>
-            <a:normAutofit/>
+            <a:normAutofit fontScale="92500" lnSpcReduction="10000"/>
           </a:bodyPr>
           <a:lstStyle/>
           <a:p>
             <a:pPr marL="0" indent="0">
               <a:buNone/>
             </a:pPr>
+            <a:endParaRPr lang="en-US" dirty="0"/>
+          </a:p>
+          <a:p>
+            <a:r>
+              <a:rPr lang="en-US" dirty="0" err="1"/>
+              <a:t>VSCode</a:t>
+            </a:r>
             <a:r>
               <a:rPr lang="en-US" dirty="0"/>
-              <a:t>https://code.visualstudio.com/download</a:t>
+              <a:t> is a popular code editor with extensive Python support, offering features like code completion, debugging, and an integrated terminal.</a:t>
+            </a:r>
+          </a:p>
+          <a:p>
+            <a:pPr marL="0" indent="0">
+              <a:buNone/>
+            </a:pPr>
+            <a:endParaRPr lang="en-US" dirty="0"/>
+          </a:p>
+          <a:p>
+            <a:r>
+              <a:rPr lang="en-US" dirty="0"/>
+              <a:t>With its vast extension ecosystem, </a:t>
+            </a:r>
+            <a:r>
+              <a:rPr lang="en-US" dirty="0" err="1"/>
+              <a:t>VSCode</a:t>
+            </a:r>
+            <a:r>
+              <a:rPr lang="en-US" dirty="0"/>
+              <a:t> allows developers to customize and enhance their Python development experience to suit their specific needs.</a:t>
+            </a:r>
+          </a:p>
+          <a:p>
+            <a:pPr marL="0" indent="0">
+              <a:buNone/>
+            </a:pPr>
+            <a:endParaRPr lang="en-US" dirty="0"/>
+          </a:p>
+          <a:p>
+            <a:r>
+              <a:rPr lang="en-US" dirty="0" err="1"/>
+              <a:t>VSCode's</a:t>
+            </a:r>
+            <a:r>
+              <a:rPr lang="en-US" dirty="0"/>
+              <a:t> cross-platform compatibility and lightweight design make it a flexible choice for Python developers seeking a versatile and efficient coding environment.</a:t>
             </a:r>
           </a:p>
         </p:txBody>
@@ -15783,7 +16465,7 @@
     </p:spTree>
     <p:extLst>
       <p:ext uri="{BB962C8B-B14F-4D97-AF65-F5344CB8AC3E}">
-        <p14:creationId xmlns:p14="http://schemas.microsoft.com/office/powerpoint/2010/main" val="1848218500"/>
+        <p14:creationId xmlns:p14="http://schemas.microsoft.com/office/powerpoint/2010/main" val="2304337233"/>
       </p:ext>
     </p:extLst>
   </p:cSld>
@@ -15828,267 +16510,50 @@
           <a:lstStyle/>
           <a:p>
             <a:r>
-              <a:rPr lang="en-GB" dirty="0"/>
-              <a:t>Setup </a:t>
-            </a:r>
-            <a:r>
-              <a:rPr lang="en-GB" dirty="0" err="1"/>
-              <a:t>VSCode</a:t>
-            </a:r>
-            <a:r>
-              <a:rPr lang="en-GB" dirty="0"/>
-              <a:t> for Python </a:t>
-            </a:r>
-            <a:endParaRPr lang="en-US" dirty="0"/>
-          </a:p>
-        </p:txBody>
-      </p:sp>
-      <p:pic>
-        <p:nvPicPr>
-          <p:cNvPr id="9" name="Content Placeholder 8">
-            <a:extLst>
-              <a:ext uri="{FF2B5EF4-FFF2-40B4-BE49-F238E27FC236}">
-                <a16:creationId xmlns:a16="http://schemas.microsoft.com/office/drawing/2014/main" id="{930341CC-6F63-4EEE-9590-B3A61A4049E5}"/>
-              </a:ext>
-            </a:extLst>
-          </p:cNvPr>
-          <p:cNvPicPr>
-            <a:picLocks noGrp="1" noChangeAspect="1"/>
-          </p:cNvPicPr>
+              <a:rPr lang="en-US" dirty="0"/>
+              <a:t>Download Visual Studio Code</a:t>
+            </a:r>
+            <a:endParaRPr lang="en-US" i="0" dirty="0">
+              <a:solidFill>
+                <a:srgbClr val="242424"/>
+              </a:solidFill>
+              <a:effectLst/>
+              <a:latin typeface="Segoe UI" panose="020B0502040204020203" pitchFamily="34" charset="0"/>
+            </a:endParaRPr>
+          </a:p>
+        </p:txBody>
+      </p:sp>
+      <p:sp>
+        <p:nvSpPr>
+          <p:cNvPr id="3" name="Content Placeholder 2"/>
+          <p:cNvSpPr>
+            <a:spLocks noGrp="1"/>
+          </p:cNvSpPr>
           <p:nvPr>
             <p:ph idx="1"/>
           </p:nvPr>
-        </p:nvPicPr>
-        <p:blipFill>
-          <a:blip r:embed="rId3">
-            <a:extLst>
-              <a:ext uri="{28A0092B-C50C-407E-A947-70E740481C1C}">
-                <a14:useLocalDpi xmlns:a14="http://schemas.microsoft.com/office/drawing/2010/main" val="0"/>
-              </a:ext>
-            </a:extLst>
-          </a:blip>
-          <a:stretch>
-            <a:fillRect/>
-          </a:stretch>
-        </p:blipFill>
-        <p:spPr>
-          <a:xfrm>
-            <a:off x="5777159" y="1868487"/>
-            <a:ext cx="6000936" cy="4515380"/>
-          </a:xfrm>
-        </p:spPr>
-      </p:pic>
-      <p:sp>
-        <p:nvSpPr>
-          <p:cNvPr id="10" name="TextBox 9">
-            <a:extLst>
-              <a:ext uri="{FF2B5EF4-FFF2-40B4-BE49-F238E27FC236}">
-                <a16:creationId xmlns:a16="http://schemas.microsoft.com/office/drawing/2014/main" id="{3497A8A4-177D-4E9C-BA15-7E47D950F550}"/>
-              </a:ext>
-            </a:extLst>
-          </p:cNvPr>
-          <p:cNvSpPr txBox="1"/>
-          <p:nvPr/>
-        </p:nvSpPr>
-        <p:spPr>
-          <a:xfrm>
-            <a:off x="762000" y="1868486"/>
-            <a:ext cx="4622800" cy="3046988"/>
-          </a:xfrm>
-          <a:prstGeom prst="rect">
-            <a:avLst/>
-          </a:prstGeom>
-          <a:noFill/>
-        </p:spPr>
-        <p:txBody>
-          <a:bodyPr wrap="square" rtlCol="0">
-            <a:spAutoFit/>
+        </p:nvSpPr>
+        <p:spPr/>
+        <p:txBody>
+          <a:bodyPr>
+            <a:normAutofit/>
           </a:bodyPr>
           <a:lstStyle/>
           <a:p>
-            <a:pPr marL="514350" indent="-514350">
-              <a:buAutoNum type="arabicPeriod"/>
+            <a:pPr marL="0" indent="0">
+              <a:buNone/>
             </a:pPr>
             <a:r>
-              <a:rPr lang="en-GB" sz="3200" dirty="0"/>
-              <a:t>Click on extension icon in navigation panel.</a:t>
-            </a:r>
-          </a:p>
-          <a:p>
-            <a:pPr marL="514350" indent="-514350">
-              <a:buAutoNum type="arabicPeriod"/>
-            </a:pPr>
-            <a:r>
-              <a:rPr lang="en-GB" sz="3200" dirty="0"/>
-              <a:t>Write in search field “python” to find official Python extension.</a:t>
-            </a:r>
-          </a:p>
-          <a:p>
-            <a:pPr marL="514350" indent="-514350">
-              <a:buFontTx/>
-              <a:buAutoNum type="arabicPeriod"/>
-            </a:pPr>
-            <a:r>
-              <a:rPr lang="en-GB" sz="3200" dirty="0"/>
-              <a:t>Click “Install”</a:t>
-            </a:r>
-          </a:p>
-        </p:txBody>
-      </p:sp>
-      <p:sp>
-        <p:nvSpPr>
-          <p:cNvPr id="11" name="Oval 10">
-            <a:extLst>
-              <a:ext uri="{FF2B5EF4-FFF2-40B4-BE49-F238E27FC236}">
-                <a16:creationId xmlns:a16="http://schemas.microsoft.com/office/drawing/2014/main" id="{944518BE-114D-424C-90D4-35CDFABBA0DD}"/>
-              </a:ext>
-            </a:extLst>
-          </p:cNvPr>
-          <p:cNvSpPr/>
-          <p:nvPr/>
-        </p:nvSpPr>
-        <p:spPr>
-          <a:xfrm>
-            <a:off x="8788879" y="2235200"/>
-            <a:ext cx="431800" cy="423333"/>
-          </a:xfrm>
-          <a:prstGeom prst="ellipse">
-            <a:avLst/>
-          </a:prstGeom>
-        </p:spPr>
-        <p:style>
-          <a:lnRef idx="2">
-            <a:schemeClr val="accent1">
-              <a:shade val="50000"/>
-            </a:schemeClr>
-          </a:lnRef>
-          <a:fillRef idx="1">
-            <a:schemeClr val="accent1"/>
-          </a:fillRef>
-          <a:effectRef idx="0">
-            <a:schemeClr val="accent1"/>
-          </a:effectRef>
-          <a:fontRef idx="minor">
-            <a:schemeClr val="lt1"/>
-          </a:fontRef>
-        </p:style>
-        <p:txBody>
-          <a:bodyPr rtlCol="0" anchor="ctr"/>
-          <a:lstStyle/>
-          <a:p>
-            <a:pPr algn="ctr"/>
-            <a:r>
-              <a:rPr lang="en-GB" dirty="0"/>
-              <a:t>2</a:t>
-            </a:r>
-            <a:endParaRPr lang="en-US" dirty="0"/>
-          </a:p>
-        </p:txBody>
-      </p:sp>
-      <p:sp>
-        <p:nvSpPr>
-          <p:cNvPr id="12" name="Oval 11">
-            <a:extLst>
-              <a:ext uri="{FF2B5EF4-FFF2-40B4-BE49-F238E27FC236}">
-                <a16:creationId xmlns:a16="http://schemas.microsoft.com/office/drawing/2014/main" id="{5D2DD891-2CEA-4FBF-9100-A0BCA4CBDD4B}"/>
-              </a:ext>
-            </a:extLst>
-          </p:cNvPr>
-          <p:cNvSpPr/>
-          <p:nvPr/>
-        </p:nvSpPr>
-        <p:spPr>
-          <a:xfrm>
-            <a:off x="8788879" y="2717799"/>
-            <a:ext cx="431800" cy="423333"/>
-          </a:xfrm>
-          <a:prstGeom prst="ellipse">
-            <a:avLst/>
-          </a:prstGeom>
-        </p:spPr>
-        <p:style>
-          <a:lnRef idx="2">
-            <a:schemeClr val="accent1">
-              <a:shade val="50000"/>
-            </a:schemeClr>
-          </a:lnRef>
-          <a:fillRef idx="1">
-            <a:schemeClr val="accent1"/>
-          </a:fillRef>
-          <a:effectRef idx="0">
-            <a:schemeClr val="accent1"/>
-          </a:effectRef>
-          <a:fontRef idx="minor">
-            <a:schemeClr val="lt1"/>
-          </a:fontRef>
-        </p:style>
-        <p:txBody>
-          <a:bodyPr rtlCol="0" anchor="ctr"/>
-          <a:lstStyle/>
-          <a:p>
-            <a:pPr algn="ctr"/>
-            <a:r>
-              <a:rPr lang="en-GB" dirty="0"/>
-              <a:t>3</a:t>
-            </a:r>
-            <a:endParaRPr lang="en-US" dirty="0"/>
-          </a:p>
-        </p:txBody>
-      </p:sp>
-      <p:sp>
-        <p:nvSpPr>
-          <p:cNvPr id="13" name="Oval 12">
-            <a:extLst>
-              <a:ext uri="{FF2B5EF4-FFF2-40B4-BE49-F238E27FC236}">
-                <a16:creationId xmlns:a16="http://schemas.microsoft.com/office/drawing/2014/main" id="{318C1CE2-8DC1-4A51-B529-7A88829DE8B0}"/>
-              </a:ext>
-            </a:extLst>
-          </p:cNvPr>
-          <p:cNvSpPr/>
-          <p:nvPr/>
-        </p:nvSpPr>
-        <p:spPr>
-          <a:xfrm>
-            <a:off x="5707012" y="4492141"/>
-            <a:ext cx="431800" cy="423333"/>
-          </a:xfrm>
-          <a:prstGeom prst="ellipse">
-            <a:avLst/>
-          </a:prstGeom>
-        </p:spPr>
-        <p:style>
-          <a:lnRef idx="2">
-            <a:schemeClr val="accent1">
-              <a:shade val="50000"/>
-            </a:schemeClr>
-          </a:lnRef>
-          <a:fillRef idx="1">
-            <a:schemeClr val="accent1"/>
-          </a:fillRef>
-          <a:effectRef idx="0">
-            <a:schemeClr val="accent1"/>
-          </a:effectRef>
-          <a:fontRef idx="minor">
-            <a:schemeClr val="lt1"/>
-          </a:fontRef>
-        </p:style>
-        <p:txBody>
-          <a:bodyPr rtlCol="0" anchor="ctr"/>
-          <a:lstStyle/>
-          <a:p>
-            <a:pPr algn="ctr"/>
-            <a:r>
-              <a:rPr lang="en-GB" dirty="0"/>
-              <a:t>1</a:t>
-            </a:r>
-            <a:endParaRPr lang="en-US" dirty="0"/>
+              <a:rPr lang="en-US" dirty="0"/>
+              <a:t>https://code.visualstudio.com/download</a:t>
+            </a:r>
           </a:p>
         </p:txBody>
       </p:sp>
     </p:spTree>
     <p:extLst>
       <p:ext uri="{BB962C8B-B14F-4D97-AF65-F5344CB8AC3E}">
-        <p14:creationId xmlns:p14="http://schemas.microsoft.com/office/powerpoint/2010/main" val="1294030913"/>
+        <p14:creationId xmlns:p14="http://schemas.microsoft.com/office/powerpoint/2010/main" val="1848218500"/>
       </p:ext>
     </p:extLst>
   </p:cSld>

</xml_diff>